<commit_message>
Added a demo for the kernels.
</commit_message>
<xml_diff>
--- a/lectures/Lect08_SVM.pptx
+++ b/lectures/Lect08_SVM.pptx
@@ -5,7 +5,7 @@
     <p:sldMasterId id="2147483648" r:id="rId1"/>
   </p:sldMasterIdLst>
   <p:notesMasterIdLst>
-    <p:notesMasterId r:id="rId59"/>
+    <p:notesMasterId r:id="rId60"/>
   </p:notesMasterIdLst>
   <p:sldIdLst>
     <p:sldId id="258" r:id="rId2"/>
@@ -50,21 +50,22 @@
     <p:sldId id="319" r:id="rId41"/>
     <p:sldId id="371" r:id="rId42"/>
     <p:sldId id="373" r:id="rId43"/>
-    <p:sldId id="320" r:id="rId44"/>
-    <p:sldId id="322" r:id="rId45"/>
-    <p:sldId id="321" r:id="rId46"/>
-    <p:sldId id="323" r:id="rId47"/>
-    <p:sldId id="299" r:id="rId48"/>
-    <p:sldId id="300" r:id="rId49"/>
-    <p:sldId id="301" r:id="rId50"/>
-    <p:sldId id="307" r:id="rId51"/>
-    <p:sldId id="309" r:id="rId52"/>
-    <p:sldId id="308" r:id="rId53"/>
-    <p:sldId id="310" r:id="rId54"/>
-    <p:sldId id="312" r:id="rId55"/>
-    <p:sldId id="314" r:id="rId56"/>
-    <p:sldId id="313" r:id="rId57"/>
-    <p:sldId id="365" r:id="rId58"/>
+    <p:sldId id="374" r:id="rId44"/>
+    <p:sldId id="320" r:id="rId45"/>
+    <p:sldId id="322" r:id="rId46"/>
+    <p:sldId id="321" r:id="rId47"/>
+    <p:sldId id="323" r:id="rId48"/>
+    <p:sldId id="299" r:id="rId49"/>
+    <p:sldId id="300" r:id="rId50"/>
+    <p:sldId id="301" r:id="rId51"/>
+    <p:sldId id="307" r:id="rId52"/>
+    <p:sldId id="309" r:id="rId53"/>
+    <p:sldId id="308" r:id="rId54"/>
+    <p:sldId id="310" r:id="rId55"/>
+    <p:sldId id="312" r:id="rId56"/>
+    <p:sldId id="314" r:id="rId57"/>
+    <p:sldId id="313" r:id="rId58"/>
+    <p:sldId id="365" r:id="rId59"/>
   </p:sldIdLst>
   <p:sldSz cx="12192000" cy="6858000"/>
   <p:notesSz cx="7315200" cy="9601200"/>
@@ -27805,6 +27806,58 @@
       </p:grpSpPr>
       <p:sp>
         <p:nvSpPr>
+          <p:cNvPr id="5" name="Rectangle: Rounded Corners 4">
+            <a:extLst>
+              <a:ext uri="{FF2B5EF4-FFF2-40B4-BE49-F238E27FC236}">
+                <a16:creationId xmlns:a16="http://schemas.microsoft.com/office/drawing/2014/main" id="{41E00BB5-6736-4BAD-A7A5-61AD4CCC2818}"/>
+              </a:ext>
+            </a:extLst>
+          </p:cNvPr>
+          <p:cNvSpPr/>
+          <p:nvPr/>
+        </p:nvSpPr>
+        <p:spPr>
+          <a:xfrm>
+            <a:off x="4408227" y="1835624"/>
+            <a:ext cx="3186752" cy="1235122"/>
+          </a:xfrm>
+          <a:prstGeom prst="roundRect">
+            <a:avLst/>
+          </a:prstGeom>
+          <a:solidFill>
+            <a:schemeClr val="tx2">
+              <a:lumMod val="20000"/>
+              <a:lumOff val="80000"/>
+            </a:schemeClr>
+          </a:solidFill>
+        </p:spPr>
+        <p:style>
+          <a:lnRef idx="2">
+            <a:schemeClr val="accent1">
+              <a:shade val="50000"/>
+            </a:schemeClr>
+          </a:lnRef>
+          <a:fillRef idx="1">
+            <a:schemeClr val="accent1"/>
+          </a:fillRef>
+          <a:effectRef idx="0">
+            <a:schemeClr val="accent1"/>
+          </a:effectRef>
+          <a:fontRef idx="minor">
+            <a:schemeClr val="lt1"/>
+          </a:fontRef>
+        </p:style>
+        <p:txBody>
+          <a:bodyPr rtlCol="0" anchor="ctr"/>
+          <a:lstStyle/>
+          <a:p>
+            <a:pPr algn="ctr"/>
+            <a:endParaRPr lang="en-US"/>
+          </a:p>
+        </p:txBody>
+      </p:sp>
+      <p:sp>
+        <p:nvSpPr>
           <p:cNvPr id="2" name="Title 1"/>
           <p:cNvSpPr>
             <a:spLocks noGrp="1"/>
@@ -27820,7 +27873,7 @@
           <a:p>
             <a:r>
               <a:rPr lang="en-US" dirty="0"/>
-              <a:t>Kernel Trick</a:t>
+              <a:t>“Kernel Trick”</a:t>
             </a:r>
           </a:p>
         </p:txBody>
@@ -27960,359 +28013,373 @@
                 </a:r>
               </a:p>
               <a:p>
-                <a:pPr lvl="1"/>
+                <a:pPr marL="201168" lvl="1" indent="0">
+                  <a:buNone/>
+                </a:pPr>
                 <a14:m>
-                  <m:oMath xmlns:m="http://schemas.openxmlformats.org/officeDocument/2006/math">
-                    <m:r>
-                      <a:rPr lang="en-US" i="1" smtClean="0">
-                        <a:latin typeface="Cambria Math" panose="02040503050406030204" pitchFamily="18" charset="0"/>
-                      </a:rPr>
-                      <m:t>𝑧</m:t>
-                    </m:r>
-                    <m:r>
-                      <a:rPr lang="en-US" i="1" smtClean="0">
-                        <a:latin typeface="Cambria Math" panose="02040503050406030204" pitchFamily="18" charset="0"/>
-                      </a:rPr>
-                      <m:t>=</m:t>
-                    </m:r>
-                    <m:r>
-                      <a:rPr lang="en-US" i="1">
-                        <a:latin typeface="Cambria Math" panose="02040503050406030204" pitchFamily="18" charset="0"/>
-                      </a:rPr>
-                      <m:t>𝑏</m:t>
-                    </m:r>
-                    <m:r>
-                      <a:rPr lang="en-US" i="1">
-                        <a:latin typeface="Cambria Math" panose="02040503050406030204" pitchFamily="18" charset="0"/>
-                      </a:rPr>
-                      <m:t>+</m:t>
-                    </m:r>
-                    <m:nary>
-                      <m:naryPr>
-                        <m:chr m:val="∑"/>
-                        <m:limLoc m:val="subSup"/>
-                        <m:ctrlPr>
-                          <a:rPr lang="en-US" i="1">
-                            <a:latin typeface="Cambria Math" panose="02040503050406030204" pitchFamily="18" charset="0"/>
-                          </a:rPr>
-                        </m:ctrlPr>
-                      </m:naryPr>
-                      <m:sub>
-                        <m:r>
-                          <m:rPr>
-                            <m:brk m:alnAt="25"/>
-                          </m:rPr>
-                          <a:rPr lang="en-US" i="1">
-                            <a:latin typeface="Cambria Math" panose="02040503050406030204" pitchFamily="18" charset="0"/>
-                          </a:rPr>
-                          <m:t>𝑖</m:t>
-                        </m:r>
-                        <m:r>
-                          <a:rPr lang="en-US" i="1">
-                            <a:latin typeface="Cambria Math" panose="02040503050406030204" pitchFamily="18" charset="0"/>
-                          </a:rPr>
-                          <m:t>=1</m:t>
-                        </m:r>
-                      </m:sub>
-                      <m:sup>
-                        <m:r>
-                          <a:rPr lang="en-US" i="1">
-                            <a:latin typeface="Cambria Math" panose="02040503050406030204" pitchFamily="18" charset="0"/>
-                          </a:rPr>
-                          <m:t>𝑁</m:t>
-                        </m:r>
-                      </m:sup>
-                      <m:e>
-                        <m:sSub>
-                          <m:sSubPr>
-                            <m:ctrlPr>
-                              <a:rPr lang="en-US" i="1">
-                                <a:latin typeface="Cambria Math" panose="02040503050406030204" pitchFamily="18" charset="0"/>
-                              </a:rPr>
-                            </m:ctrlPr>
-                          </m:sSubPr>
-                          <m:e>
-                            <m:r>
-                              <a:rPr lang="en-US" i="1">
-                                <a:latin typeface="Cambria Math" panose="02040503050406030204" pitchFamily="18" charset="0"/>
-                              </a:rPr>
-                              <m:t>𝛼</m:t>
-                            </m:r>
-                          </m:e>
-                          <m:sub>
-                            <m:r>
-                              <a:rPr lang="en-US" i="1">
-                                <a:latin typeface="Cambria Math" panose="02040503050406030204" pitchFamily="18" charset="0"/>
-                              </a:rPr>
-                              <m:t>𝑖</m:t>
-                            </m:r>
-                          </m:sub>
-                        </m:sSub>
-                        <m:sSub>
-                          <m:sSubPr>
-                            <m:ctrlPr>
-                              <a:rPr lang="en-US" i="1">
-                                <a:latin typeface="Cambria Math" panose="02040503050406030204" pitchFamily="18" charset="0"/>
-                              </a:rPr>
-                            </m:ctrlPr>
-                          </m:sSubPr>
-                          <m:e>
-                            <m:r>
-                              <a:rPr lang="en-US" i="1">
-                                <a:latin typeface="Cambria Math" panose="02040503050406030204" pitchFamily="18" charset="0"/>
-                              </a:rPr>
-                              <m:t>𝑦</m:t>
-                            </m:r>
-                          </m:e>
-                          <m:sub>
-                            <m:r>
-                              <a:rPr lang="en-US" i="1">
-                                <a:latin typeface="Cambria Math" panose="02040503050406030204" pitchFamily="18" charset="0"/>
-                              </a:rPr>
-                              <m:t>𝑖</m:t>
-                            </m:r>
-                          </m:sub>
-                        </m:sSub>
-                        <m:r>
-                          <a:rPr lang="en-US" b="0" i="1" smtClean="0">
-                            <a:latin typeface="Cambria Math" panose="02040503050406030204" pitchFamily="18" charset="0"/>
-                          </a:rPr>
-                          <m:t>𝐾</m:t>
-                        </m:r>
-                        <m:d>
-                          <m:dPr>
-                            <m:ctrlPr>
-                              <a:rPr lang="en-US" b="0" i="1" smtClean="0">
-                                <a:latin typeface="Cambria Math" panose="02040503050406030204" pitchFamily="18" charset="0"/>
-                              </a:rPr>
-                            </m:ctrlPr>
-                          </m:dPr>
-                          <m:e>
-                            <m:sSub>
-                              <m:sSubPr>
-                                <m:ctrlPr>
-                                  <a:rPr lang="en-US" b="0" i="1" smtClean="0">
-                                    <a:latin typeface="Cambria Math" panose="02040503050406030204" pitchFamily="18" charset="0"/>
-                                  </a:rPr>
-                                </m:ctrlPr>
-                              </m:sSubPr>
-                              <m:e>
-                                <m:r>
-                                  <a:rPr lang="en-US" b="1" i="1" smtClean="0">
-                                    <a:latin typeface="Cambria Math" panose="02040503050406030204" pitchFamily="18" charset="0"/>
-                                  </a:rPr>
-                                  <m:t>𝒙</m:t>
-                                </m:r>
-                              </m:e>
-                              <m:sub>
-                                <m:r>
-                                  <a:rPr lang="en-US" b="0" i="1" smtClean="0">
-                                    <a:latin typeface="Cambria Math" panose="02040503050406030204" pitchFamily="18" charset="0"/>
-                                  </a:rPr>
-                                  <m:t>𝑖</m:t>
-                                </m:r>
-                              </m:sub>
-                            </m:sSub>
-                            <m:r>
-                              <a:rPr lang="en-US" b="0" i="1" smtClean="0">
-                                <a:latin typeface="Cambria Math" panose="02040503050406030204" pitchFamily="18" charset="0"/>
-                              </a:rPr>
-                              <m:t>,</m:t>
-                            </m:r>
-                            <m:r>
-                              <a:rPr lang="en-US" b="1" i="1" smtClean="0">
-                                <a:latin typeface="Cambria Math" panose="02040503050406030204" pitchFamily="18" charset="0"/>
-                              </a:rPr>
-                              <m:t>𝒙</m:t>
-                            </m:r>
-                          </m:e>
-                        </m:d>
-                      </m:e>
-                    </m:nary>
-                    <m:r>
-                      <a:rPr lang="en-US" b="0" i="1" smtClean="0">
-                        <a:latin typeface="Cambria Math" panose="02040503050406030204" pitchFamily="18" charset="0"/>
-                      </a:rPr>
-                      <m:t>, </m:t>
-                    </m:r>
-                  </m:oMath>
+                  <m:oMathPara xmlns:m="http://schemas.openxmlformats.org/officeDocument/2006/math">
+                    <m:oMathParaPr>
+                      <m:jc m:val="centerGroup"/>
+                    </m:oMathParaPr>
+                    <m:oMath xmlns:m="http://schemas.openxmlformats.org/officeDocument/2006/math">
+                      <m:r>
+                        <a:rPr lang="en-US" i="1" smtClean="0">
+                          <a:latin typeface="Cambria Math" panose="02040503050406030204" pitchFamily="18" charset="0"/>
+                        </a:rPr>
+                        <m:t>𝑧</m:t>
+                      </m:r>
+                      <m:r>
+                        <a:rPr lang="en-US" i="1" smtClean="0">
+                          <a:latin typeface="Cambria Math" panose="02040503050406030204" pitchFamily="18" charset="0"/>
+                        </a:rPr>
+                        <m:t>=</m:t>
+                      </m:r>
+                      <m:r>
+                        <a:rPr lang="en-US" i="1">
+                          <a:latin typeface="Cambria Math" panose="02040503050406030204" pitchFamily="18" charset="0"/>
+                        </a:rPr>
+                        <m:t>𝑏</m:t>
+                      </m:r>
+                      <m:r>
+                        <a:rPr lang="en-US" i="1">
+                          <a:latin typeface="Cambria Math" panose="02040503050406030204" pitchFamily="18" charset="0"/>
+                        </a:rPr>
+                        <m:t>+</m:t>
+                      </m:r>
+                      <m:nary>
+                        <m:naryPr>
+                          <m:chr m:val="∑"/>
+                          <m:limLoc m:val="subSup"/>
+                          <m:ctrlPr>
+                            <a:rPr lang="en-US" i="1">
+                              <a:latin typeface="Cambria Math" panose="02040503050406030204" pitchFamily="18" charset="0"/>
+                            </a:rPr>
+                          </m:ctrlPr>
+                        </m:naryPr>
+                        <m:sub>
+                          <m:r>
+                            <m:rPr>
+                              <m:brk m:alnAt="25"/>
+                            </m:rPr>
+                            <a:rPr lang="en-US" i="1">
+                              <a:latin typeface="Cambria Math" panose="02040503050406030204" pitchFamily="18" charset="0"/>
+                            </a:rPr>
+                            <m:t>𝑖</m:t>
+                          </m:r>
+                          <m:r>
+                            <a:rPr lang="en-US" i="1">
+                              <a:latin typeface="Cambria Math" panose="02040503050406030204" pitchFamily="18" charset="0"/>
+                            </a:rPr>
+                            <m:t>=1</m:t>
+                          </m:r>
+                        </m:sub>
+                        <m:sup>
+                          <m:r>
+                            <a:rPr lang="en-US" i="1">
+                              <a:latin typeface="Cambria Math" panose="02040503050406030204" pitchFamily="18" charset="0"/>
+                            </a:rPr>
+                            <m:t>𝑁</m:t>
+                          </m:r>
+                        </m:sup>
+                        <m:e>
+                          <m:sSub>
+                            <m:sSubPr>
+                              <m:ctrlPr>
+                                <a:rPr lang="en-US" i="1">
+                                  <a:latin typeface="Cambria Math" panose="02040503050406030204" pitchFamily="18" charset="0"/>
+                                </a:rPr>
+                              </m:ctrlPr>
+                            </m:sSubPr>
+                            <m:e>
+                              <m:r>
+                                <a:rPr lang="en-US" i="1">
+                                  <a:latin typeface="Cambria Math" panose="02040503050406030204" pitchFamily="18" charset="0"/>
+                                </a:rPr>
+                                <m:t>𝛼</m:t>
+                              </m:r>
+                            </m:e>
+                            <m:sub>
+                              <m:r>
+                                <a:rPr lang="en-US" i="1">
+                                  <a:latin typeface="Cambria Math" panose="02040503050406030204" pitchFamily="18" charset="0"/>
+                                </a:rPr>
+                                <m:t>𝑖</m:t>
+                              </m:r>
+                            </m:sub>
+                          </m:sSub>
+                          <m:sSub>
+                            <m:sSubPr>
+                              <m:ctrlPr>
+                                <a:rPr lang="en-US" i="1">
+                                  <a:latin typeface="Cambria Math" panose="02040503050406030204" pitchFamily="18" charset="0"/>
+                                </a:rPr>
+                              </m:ctrlPr>
+                            </m:sSubPr>
+                            <m:e>
+                              <m:r>
+                                <a:rPr lang="en-US" i="1">
+                                  <a:latin typeface="Cambria Math" panose="02040503050406030204" pitchFamily="18" charset="0"/>
+                                </a:rPr>
+                                <m:t>𝑦</m:t>
+                              </m:r>
+                            </m:e>
+                            <m:sub>
+                              <m:r>
+                                <a:rPr lang="en-US" i="1">
+                                  <a:latin typeface="Cambria Math" panose="02040503050406030204" pitchFamily="18" charset="0"/>
+                                </a:rPr>
+                                <m:t>𝑖</m:t>
+                              </m:r>
+                            </m:sub>
+                          </m:sSub>
+                          <m:r>
+                            <a:rPr lang="en-US" b="0" i="1" smtClean="0">
+                              <a:latin typeface="Cambria Math" panose="02040503050406030204" pitchFamily="18" charset="0"/>
+                            </a:rPr>
+                            <m:t>𝐾</m:t>
+                          </m:r>
+                          <m:d>
+                            <m:dPr>
+                              <m:ctrlPr>
+                                <a:rPr lang="en-US" b="0" i="1" smtClean="0">
+                                  <a:latin typeface="Cambria Math" panose="02040503050406030204" pitchFamily="18" charset="0"/>
+                                </a:rPr>
+                              </m:ctrlPr>
+                            </m:dPr>
+                            <m:e>
+                              <m:sSub>
+                                <m:sSubPr>
+                                  <m:ctrlPr>
+                                    <a:rPr lang="en-US" b="0" i="1" smtClean="0">
+                                      <a:latin typeface="Cambria Math" panose="02040503050406030204" pitchFamily="18" charset="0"/>
+                                    </a:rPr>
+                                  </m:ctrlPr>
+                                </m:sSubPr>
+                                <m:e>
+                                  <m:r>
+                                    <a:rPr lang="en-US" b="1" i="1" smtClean="0">
+                                      <a:latin typeface="Cambria Math" panose="02040503050406030204" pitchFamily="18" charset="0"/>
+                                    </a:rPr>
+                                    <m:t>𝒙</m:t>
+                                  </m:r>
+                                </m:e>
+                                <m:sub>
+                                  <m:r>
+                                    <a:rPr lang="en-US" b="0" i="1" smtClean="0">
+                                      <a:latin typeface="Cambria Math" panose="02040503050406030204" pitchFamily="18" charset="0"/>
+                                    </a:rPr>
+                                    <m:t>𝑖</m:t>
+                                  </m:r>
+                                </m:sub>
+                              </m:sSub>
+                              <m:r>
+                                <a:rPr lang="en-US" b="0" i="1" smtClean="0">
+                                  <a:latin typeface="Cambria Math" panose="02040503050406030204" pitchFamily="18" charset="0"/>
+                                </a:rPr>
+                                <m:t>,</m:t>
+                              </m:r>
+                              <m:r>
+                                <a:rPr lang="en-US" b="1" i="1" smtClean="0">
+                                  <a:latin typeface="Cambria Math" panose="02040503050406030204" pitchFamily="18" charset="0"/>
+                                </a:rPr>
+                                <m:t>𝒙</m:t>
+                              </m:r>
+                            </m:e>
+                          </m:d>
+                        </m:e>
+                      </m:nary>
+                      <m:r>
+                        <a:rPr lang="en-US" b="0" i="1" smtClean="0">
+                          <a:latin typeface="Cambria Math" panose="02040503050406030204" pitchFamily="18" charset="0"/>
+                        </a:rPr>
+                        <m:t>, </m:t>
+                      </m:r>
+                    </m:oMath>
+                  </m:oMathPara>
                 </a14:m>
                 <a:endParaRPr lang="en-US" b="0" i="1" dirty="0">
                   <a:latin typeface="Cambria Math" panose="02040503050406030204" pitchFamily="18" charset="0"/>
                 </a:endParaRPr>
               </a:p>
               <a:p>
-                <a:pPr lvl="1"/>
+                <a:pPr marL="201168" lvl="1" indent="0">
+                  <a:buNone/>
+                </a:pPr>
                 <a14:m>
-                  <m:oMath xmlns:m="http://schemas.openxmlformats.org/officeDocument/2006/math">
-                    <m:acc>
-                      <m:accPr>
-                        <m:chr m:val="̂"/>
-                        <m:ctrlPr>
-                          <a:rPr lang="en-US" i="1" smtClean="0">
-                            <a:latin typeface="Cambria Math" panose="02040503050406030204" pitchFamily="18" charset="0"/>
-                          </a:rPr>
-                        </m:ctrlPr>
-                      </m:accPr>
-                      <m:e>
-                        <m:r>
-                          <a:rPr lang="en-US" b="0" i="1" smtClean="0">
-                            <a:latin typeface="Cambria Math" panose="02040503050406030204" pitchFamily="18" charset="0"/>
-                          </a:rPr>
-                          <m:t>𝑦</m:t>
-                        </m:r>
-                      </m:e>
-                    </m:acc>
-                    <m:r>
-                      <a:rPr lang="en-US" b="0" i="1" smtClean="0">
-                        <a:latin typeface="Cambria Math" panose="02040503050406030204" pitchFamily="18" charset="0"/>
-                      </a:rPr>
-                      <m:t>=</m:t>
-                    </m:r>
-                    <m:r>
-                      <m:rPr>
-                        <m:nor/>
-                      </m:rPr>
-                      <a:rPr lang="en-US" b="0" i="0" smtClean="0">
-                        <a:latin typeface="Cambria Math" panose="02040503050406030204" pitchFamily="18" charset="0"/>
-                      </a:rPr>
-                      <m:t>sign</m:t>
-                    </m:r>
-                    <m:d>
-                      <m:dPr>
-                        <m:ctrlPr>
-                          <a:rPr lang="en-US" b="0" i="1" smtClean="0">
-                            <a:latin typeface="Cambria Math" panose="02040503050406030204" pitchFamily="18" charset="0"/>
-                          </a:rPr>
-                        </m:ctrlPr>
-                      </m:dPr>
-                      <m:e>
-                        <m:r>
-                          <a:rPr lang="en-US" b="0" i="1" smtClean="0">
-                            <a:latin typeface="Cambria Math" panose="02040503050406030204" pitchFamily="18" charset="0"/>
-                          </a:rPr>
-                          <m:t>𝑧</m:t>
-                        </m:r>
-                      </m:e>
-                    </m:d>
-                    <m:r>
-                      <a:rPr lang="en-US" b="0" i="1" smtClean="0">
-                        <a:latin typeface="Cambria Math" panose="02040503050406030204" pitchFamily="18" charset="0"/>
-                      </a:rPr>
-                      <m:t>=</m:t>
-                    </m:r>
-                    <m:d>
-                      <m:dPr>
-                        <m:begChr m:val="{"/>
-                        <m:endChr m:val=""/>
-                        <m:ctrlPr>
-                          <a:rPr lang="en-US" b="0" i="1" smtClean="0">
-                            <a:latin typeface="Cambria Math" panose="02040503050406030204" pitchFamily="18" charset="0"/>
-                          </a:rPr>
-                        </m:ctrlPr>
-                      </m:dPr>
-                      <m:e>
-                        <m:m>
-                          <m:mPr>
-                            <m:mcs>
-                              <m:mc>
-                                <m:mcPr>
-                                  <m:count m:val="2"/>
-                                  <m:mcJc m:val="center"/>
-                                </m:mcPr>
-                              </m:mc>
-                            </m:mcs>
-                            <m:ctrlPr>
-                              <a:rPr lang="en-US" b="0" i="1" smtClean="0">
-                                <a:latin typeface="Cambria Math" panose="02040503050406030204" pitchFamily="18" charset="0"/>
-                              </a:rPr>
-                            </m:ctrlPr>
-                          </m:mPr>
-                          <m:mr>
-                            <m:e>
-                              <m:r>
-                                <m:rPr>
-                                  <m:brk m:alnAt="7"/>
-                                </m:rPr>
+                  <m:oMathPara xmlns:m="http://schemas.openxmlformats.org/officeDocument/2006/math">
+                    <m:oMathParaPr>
+                      <m:jc m:val="centerGroup"/>
+                    </m:oMathParaPr>
+                    <m:oMath xmlns:m="http://schemas.openxmlformats.org/officeDocument/2006/math">
+                      <m:acc>
+                        <m:accPr>
+                          <m:chr m:val="̂"/>
+                          <m:ctrlPr>
+                            <a:rPr lang="en-US" i="1" smtClean="0">
+                              <a:latin typeface="Cambria Math" panose="02040503050406030204" pitchFamily="18" charset="0"/>
+                            </a:rPr>
+                          </m:ctrlPr>
+                        </m:accPr>
+                        <m:e>
+                          <m:r>
+                            <a:rPr lang="en-US" b="0" i="1" smtClean="0">
+                              <a:latin typeface="Cambria Math" panose="02040503050406030204" pitchFamily="18" charset="0"/>
+                            </a:rPr>
+                            <m:t>𝑦</m:t>
+                          </m:r>
+                        </m:e>
+                      </m:acc>
+                      <m:r>
+                        <a:rPr lang="en-US" b="0" i="1" smtClean="0">
+                          <a:latin typeface="Cambria Math" panose="02040503050406030204" pitchFamily="18" charset="0"/>
+                        </a:rPr>
+                        <m:t>=</m:t>
+                      </m:r>
+                      <m:r>
+                        <m:rPr>
+                          <m:nor/>
+                        </m:rPr>
+                        <a:rPr lang="en-US" b="0" i="0" smtClean="0">
+                          <a:latin typeface="Cambria Math" panose="02040503050406030204" pitchFamily="18" charset="0"/>
+                        </a:rPr>
+                        <m:t>sign</m:t>
+                      </m:r>
+                      <m:d>
+                        <m:dPr>
+                          <m:ctrlPr>
+                            <a:rPr lang="en-US" b="0" i="1" smtClean="0">
+                              <a:latin typeface="Cambria Math" panose="02040503050406030204" pitchFamily="18" charset="0"/>
+                            </a:rPr>
+                          </m:ctrlPr>
+                        </m:dPr>
+                        <m:e>
+                          <m:r>
+                            <a:rPr lang="en-US" b="0" i="1" smtClean="0">
+                              <a:latin typeface="Cambria Math" panose="02040503050406030204" pitchFamily="18" charset="0"/>
+                            </a:rPr>
+                            <m:t>𝑧</m:t>
+                          </m:r>
+                        </m:e>
+                      </m:d>
+                      <m:r>
+                        <a:rPr lang="en-US" b="0" i="1" smtClean="0">
+                          <a:latin typeface="Cambria Math" panose="02040503050406030204" pitchFamily="18" charset="0"/>
+                        </a:rPr>
+                        <m:t>=</m:t>
+                      </m:r>
+                      <m:d>
+                        <m:dPr>
+                          <m:begChr m:val="{"/>
+                          <m:endChr m:val=""/>
+                          <m:ctrlPr>
+                            <a:rPr lang="en-US" b="0" i="1" smtClean="0">
+                              <a:latin typeface="Cambria Math" panose="02040503050406030204" pitchFamily="18" charset="0"/>
+                            </a:rPr>
+                          </m:ctrlPr>
+                        </m:dPr>
+                        <m:e>
+                          <m:m>
+                            <m:mPr>
+                              <m:mcs>
+                                <m:mc>
+                                  <m:mcPr>
+                                    <m:count m:val="2"/>
+                                    <m:mcJc m:val="center"/>
+                                  </m:mcPr>
+                                </m:mc>
+                              </m:mcs>
+                              <m:ctrlPr>
                                 <a:rPr lang="en-US" b="0" i="1" smtClean="0">
                                   <a:latin typeface="Cambria Math" panose="02040503050406030204" pitchFamily="18" charset="0"/>
                                 </a:rPr>
-                                <m:t>1</m:t>
-                              </m:r>
-                            </m:e>
-                            <m:e>
-                              <m:r>
-                                <m:rPr>
-                                  <m:nor/>
-                                </m:rPr>
-                                <a:rPr lang="en-US" b="0" i="0" smtClean="0">
-                                  <a:latin typeface="Cambria Math" panose="02040503050406030204" pitchFamily="18" charset="0"/>
-                                </a:rPr>
-                                <m:t>if</m:t>
-                              </m:r>
-                              <m:r>
-                                <a:rPr lang="en-US" b="0" i="1" smtClean="0">
-                                  <a:latin typeface="Cambria Math" panose="02040503050406030204" pitchFamily="18" charset="0"/>
-                                </a:rPr>
-                                <m:t> </m:t>
-                              </m:r>
-                              <m:r>
-                                <a:rPr lang="en-US" b="0" i="1" smtClean="0">
-                                  <a:latin typeface="Cambria Math" panose="02040503050406030204" pitchFamily="18" charset="0"/>
-                                </a:rPr>
-                                <m:t>𝑧</m:t>
-                              </m:r>
-                              <m:r>
-                                <a:rPr lang="en-US" b="0" i="1" smtClean="0">
-                                  <a:latin typeface="Cambria Math" panose="02040503050406030204" pitchFamily="18" charset="0"/>
-                                </a:rPr>
-                                <m:t>&gt;0</m:t>
-                              </m:r>
-                            </m:e>
-                          </m:mr>
-                          <m:mr>
-                            <m:e>
-                              <m:r>
-                                <a:rPr lang="en-US" b="0" i="1" smtClean="0">
-                                  <a:latin typeface="Cambria Math" panose="02040503050406030204" pitchFamily="18" charset="0"/>
-                                </a:rPr>
-                                <m:t>−1</m:t>
-                              </m:r>
-                            </m:e>
-                            <m:e>
-                              <m:r>
-                                <m:rPr>
-                                  <m:nor/>
-                                </m:rPr>
-                                <a:rPr lang="en-US" b="0" i="0" smtClean="0">
-                                  <a:latin typeface="Cambria Math" panose="02040503050406030204" pitchFamily="18" charset="0"/>
-                                </a:rPr>
-                                <m:t>if</m:t>
-                              </m:r>
-                              <m:r>
-                                <a:rPr lang="en-US" b="0" i="1" smtClean="0">
-                                  <a:latin typeface="Cambria Math" panose="02040503050406030204" pitchFamily="18" charset="0"/>
-                                </a:rPr>
-                                <m:t> </m:t>
-                              </m:r>
-                              <m:r>
-                                <a:rPr lang="en-US" b="0" i="1" smtClean="0">
-                                  <a:latin typeface="Cambria Math" panose="02040503050406030204" pitchFamily="18" charset="0"/>
-                                </a:rPr>
-                                <m:t>𝑧</m:t>
-                              </m:r>
-                              <m:r>
-                                <a:rPr lang="en-US" b="0" i="1" smtClean="0">
-                                  <a:latin typeface="Cambria Math" panose="02040503050406030204" pitchFamily="18" charset="0"/>
-                                </a:rPr>
-                                <m:t>&lt;0</m:t>
-                              </m:r>
-                            </m:e>
-                          </m:mr>
-                        </m:m>
-                      </m:e>
-                    </m:d>
-                  </m:oMath>
+                              </m:ctrlPr>
+                            </m:mPr>
+                            <m:mr>
+                              <m:e>
+                                <m:r>
+                                  <m:rPr>
+                                    <m:brk m:alnAt="7"/>
+                                  </m:rPr>
+                                  <a:rPr lang="en-US" b="0" i="1" smtClean="0">
+                                    <a:latin typeface="Cambria Math" panose="02040503050406030204" pitchFamily="18" charset="0"/>
+                                  </a:rPr>
+                                  <m:t>1</m:t>
+                                </m:r>
+                              </m:e>
+                              <m:e>
+                                <m:r>
+                                  <m:rPr>
+                                    <m:nor/>
+                                  </m:rPr>
+                                  <a:rPr lang="en-US" b="0" i="0" smtClean="0">
+                                    <a:latin typeface="Cambria Math" panose="02040503050406030204" pitchFamily="18" charset="0"/>
+                                  </a:rPr>
+                                  <m:t>if</m:t>
+                                </m:r>
+                                <m:r>
+                                  <a:rPr lang="en-US" b="0" i="1" smtClean="0">
+                                    <a:latin typeface="Cambria Math" panose="02040503050406030204" pitchFamily="18" charset="0"/>
+                                  </a:rPr>
+                                  <m:t> </m:t>
+                                </m:r>
+                                <m:r>
+                                  <a:rPr lang="en-US" b="0" i="1" smtClean="0">
+                                    <a:latin typeface="Cambria Math" panose="02040503050406030204" pitchFamily="18" charset="0"/>
+                                  </a:rPr>
+                                  <m:t>𝑧</m:t>
+                                </m:r>
+                                <m:r>
+                                  <a:rPr lang="en-US" b="0" i="1" smtClean="0">
+                                    <a:latin typeface="Cambria Math" panose="02040503050406030204" pitchFamily="18" charset="0"/>
+                                  </a:rPr>
+                                  <m:t>&gt;0</m:t>
+                                </m:r>
+                              </m:e>
+                            </m:mr>
+                            <m:mr>
+                              <m:e>
+                                <m:r>
+                                  <a:rPr lang="en-US" b="0" i="1" smtClean="0">
+                                    <a:latin typeface="Cambria Math" panose="02040503050406030204" pitchFamily="18" charset="0"/>
+                                  </a:rPr>
+                                  <m:t>−1</m:t>
+                                </m:r>
+                              </m:e>
+                              <m:e>
+                                <m:r>
+                                  <m:rPr>
+                                    <m:nor/>
+                                  </m:rPr>
+                                  <a:rPr lang="en-US" b="0" i="0" smtClean="0">
+                                    <a:latin typeface="Cambria Math" panose="02040503050406030204" pitchFamily="18" charset="0"/>
+                                  </a:rPr>
+                                  <m:t>if</m:t>
+                                </m:r>
+                                <m:r>
+                                  <a:rPr lang="en-US" b="0" i="1" smtClean="0">
+                                    <a:latin typeface="Cambria Math" panose="02040503050406030204" pitchFamily="18" charset="0"/>
+                                  </a:rPr>
+                                  <m:t> </m:t>
+                                </m:r>
+                                <m:r>
+                                  <a:rPr lang="en-US" b="0" i="1" smtClean="0">
+                                    <a:latin typeface="Cambria Math" panose="02040503050406030204" pitchFamily="18" charset="0"/>
+                                  </a:rPr>
+                                  <m:t>𝑧</m:t>
+                                </m:r>
+                                <m:r>
+                                  <a:rPr lang="en-US" b="0" i="1" smtClean="0">
+                                    <a:latin typeface="Cambria Math" panose="02040503050406030204" pitchFamily="18" charset="0"/>
+                                  </a:rPr>
+                                  <m:t>&lt;0</m:t>
+                                </m:r>
+                              </m:e>
+                            </m:mr>
+                          </m:m>
+                        </m:e>
+                      </m:d>
+                    </m:oMath>
+                  </m:oMathPara>
                 </a14:m>
                 <a:endParaRPr lang="en-US" dirty="0"/>
               </a:p>
@@ -28391,7 +28458,7 @@
                 <a:pPr lvl="1"/>
                 <a:r>
                   <a:rPr lang="en-US" dirty="0"/>
-                  <a:t>Called the dual parameters (due to constrained optimization – see next section)</a:t>
+                  <a:t>Called the dual parameters due to constrained optimization – see next section</a:t>
                 </a:r>
               </a:p>
               <a:p>
@@ -28574,7 +28641,7 @@
               <a:blipFill>
                 <a:blip r:embed="rId2"/>
                 <a:stretch>
-                  <a:fillRect l="-1455" t="-2958"/>
+                  <a:fillRect l="-1455" t="-1549"/>
                 </a:stretch>
               </a:blipFill>
             </p:spPr>
@@ -28616,6 +28683,149 @@
           </a:p>
         </p:txBody>
       </p:sp>
+      <p:sp>
+        <p:nvSpPr>
+          <p:cNvPr id="6" name="TextBox 5">
+            <a:extLst>
+              <a:ext uri="{FF2B5EF4-FFF2-40B4-BE49-F238E27FC236}">
+                <a16:creationId xmlns:a16="http://schemas.microsoft.com/office/drawing/2014/main" id="{9D36BDF3-4B15-4EBE-B842-A3CBD6AFB5D7}"/>
+              </a:ext>
+            </a:extLst>
+          </p:cNvPr>
+          <p:cNvSpPr txBox="1"/>
+          <p:nvPr/>
+        </p:nvSpPr>
+        <p:spPr>
+          <a:xfrm>
+            <a:off x="8332312" y="1917090"/>
+            <a:ext cx="2232471" cy="923330"/>
+          </a:xfrm>
+          <a:prstGeom prst="rect">
+            <a:avLst/>
+          </a:prstGeom>
+          <a:noFill/>
+        </p:spPr>
+        <p:txBody>
+          <a:bodyPr wrap="none" rtlCol="0">
+            <a:spAutoFit/>
+          </a:bodyPr>
+          <a:lstStyle/>
+          <a:p>
+            <a:r>
+              <a:rPr lang="en-US" dirty="0">
+                <a:solidFill>
+                  <a:schemeClr val="accent1">
+                    <a:lumMod val="60000"/>
+                    <a:lumOff val="40000"/>
+                  </a:schemeClr>
+                </a:solidFill>
+              </a:rPr>
+              <a:t>Linear discriminant</a:t>
+            </a:r>
+          </a:p>
+          <a:p>
+            <a:endParaRPr lang="en-US" dirty="0">
+              <a:solidFill>
+                <a:schemeClr val="accent1">
+                  <a:lumMod val="60000"/>
+                  <a:lumOff val="40000"/>
+                </a:schemeClr>
+              </a:solidFill>
+            </a:endParaRPr>
+          </a:p>
+          <a:p>
+            <a:r>
+              <a:rPr lang="en-US" dirty="0">
+                <a:solidFill>
+                  <a:schemeClr val="accent1">
+                    <a:lumMod val="60000"/>
+                    <a:lumOff val="40000"/>
+                  </a:schemeClr>
+                </a:solidFill>
+              </a:rPr>
+              <a:t>Classification decision</a:t>
+            </a:r>
+          </a:p>
+        </p:txBody>
+      </p:sp>
+      <p:cxnSp>
+        <p:nvCxnSpPr>
+          <p:cNvPr id="8" name="Straight Arrow Connector 7">
+            <a:extLst>
+              <a:ext uri="{FF2B5EF4-FFF2-40B4-BE49-F238E27FC236}">
+                <a16:creationId xmlns:a16="http://schemas.microsoft.com/office/drawing/2014/main" id="{E2FBB162-5F41-4BAC-8417-A4E0B5ECE944}"/>
+              </a:ext>
+            </a:extLst>
+          </p:cNvPr>
+          <p:cNvCxnSpPr/>
+          <p:nvPr/>
+        </p:nvCxnSpPr>
+        <p:spPr>
+          <a:xfrm flipH="1">
+            <a:off x="7477128" y="2129051"/>
+            <a:ext cx="855184" cy="0"/>
+          </a:xfrm>
+          <a:prstGeom prst="straightConnector1">
+            <a:avLst/>
+          </a:prstGeom>
+          <a:ln>
+            <a:tailEnd type="triangle"/>
+          </a:ln>
+        </p:spPr>
+        <p:style>
+          <a:lnRef idx="1">
+            <a:schemeClr val="accent1"/>
+          </a:lnRef>
+          <a:fillRef idx="0">
+            <a:schemeClr val="accent1"/>
+          </a:fillRef>
+          <a:effectRef idx="0">
+            <a:schemeClr val="accent1"/>
+          </a:effectRef>
+          <a:fontRef idx="minor">
+            <a:schemeClr val="tx1"/>
+          </a:fontRef>
+        </p:style>
+      </p:cxnSp>
+      <p:cxnSp>
+        <p:nvCxnSpPr>
+          <p:cNvPr id="9" name="Straight Arrow Connector 8">
+            <a:extLst>
+              <a:ext uri="{FF2B5EF4-FFF2-40B4-BE49-F238E27FC236}">
+                <a16:creationId xmlns:a16="http://schemas.microsoft.com/office/drawing/2014/main" id="{7492B04E-5F72-4818-99B9-D2A01E7057FC}"/>
+              </a:ext>
+            </a:extLst>
+          </p:cNvPr>
+          <p:cNvCxnSpPr/>
+          <p:nvPr/>
+        </p:nvCxnSpPr>
+        <p:spPr>
+          <a:xfrm flipH="1">
+            <a:off x="7477128" y="2677236"/>
+            <a:ext cx="855184" cy="0"/>
+          </a:xfrm>
+          <a:prstGeom prst="straightConnector1">
+            <a:avLst/>
+          </a:prstGeom>
+          <a:ln>
+            <a:tailEnd type="triangle"/>
+          </a:ln>
+        </p:spPr>
+        <p:style>
+          <a:lnRef idx="1">
+            <a:schemeClr val="accent1"/>
+          </a:lnRef>
+          <a:fillRef idx="0">
+            <a:schemeClr val="accent1"/>
+          </a:fillRef>
+          <a:effectRef idx="0">
+            <a:schemeClr val="accent1"/>
+          </a:effectRef>
+          <a:fontRef idx="minor">
+            <a:schemeClr val="tx1"/>
+          </a:fontRef>
+        </p:style>
+      </p:cxnSp>
     </p:spTree>
     <p:extLst>
       <p:ext uri="{BB962C8B-B14F-4D97-AF65-F5344CB8AC3E}">
@@ -30614,8 +30824,8 @@
           <a:chExt cx="0" cy="0"/>
         </a:xfrm>
       </p:grpSpPr>
-      <mc:AlternateContent xmlns:mc="http://schemas.openxmlformats.org/markup-compatibility/2006">
-        <mc:Choice xmlns:a14="http://schemas.microsoft.com/office/drawing/2010/main" Requires="a14">
+      <mc:AlternateContent xmlns:mc="http://schemas.openxmlformats.org/markup-compatibility/2006" xmlns:a14="http://schemas.microsoft.com/office/drawing/2010/main">
+        <mc:Choice Requires="a14">
           <p:sp>
             <p:nvSpPr>
               <p:cNvPr id="2" name="Title 1">
@@ -30677,7 +30887,7 @@
             </p:txBody>
           </p:sp>
         </mc:Choice>
-        <mc:Fallback>
+        <mc:Fallback xmlns="">
           <p:sp>
             <p:nvSpPr>
               <p:cNvPr id="2" name="Title 1">
@@ -30717,8 +30927,8 @@
           </p:sp>
         </mc:Fallback>
       </mc:AlternateContent>
-      <mc:AlternateContent xmlns:mc="http://schemas.openxmlformats.org/markup-compatibility/2006">
-        <mc:Choice xmlns:a14="http://schemas.microsoft.com/office/drawing/2010/main" Requires="a14">
+      <mc:AlternateContent xmlns:mc="http://schemas.openxmlformats.org/markup-compatibility/2006" xmlns:a14="http://schemas.microsoft.com/office/drawing/2010/main">
+        <mc:Choice Requires="a14">
           <p:sp>
             <p:nvSpPr>
               <p:cNvPr id="3" name="Content Placeholder 2">
@@ -31189,7 +31399,7 @@
             </p:txBody>
           </p:sp>
         </mc:Choice>
-        <mc:Fallback>
+        <mc:Fallback xmlns="">
           <p:sp>
             <p:nvSpPr>
               <p:cNvPr id="3" name="Content Placeholder 2">
@@ -31258,8 +31468,8 @@
           </a:p>
         </p:txBody>
       </p:sp>
-      <mc:AlternateContent xmlns:mc="http://schemas.openxmlformats.org/markup-compatibility/2006">
-        <mc:Choice xmlns:a14="http://schemas.microsoft.com/office/drawing/2010/main" Requires="a14">
+      <mc:AlternateContent xmlns:mc="http://schemas.openxmlformats.org/markup-compatibility/2006" xmlns:a14="http://schemas.microsoft.com/office/drawing/2010/main">
+        <mc:Choice Requires="a14">
           <p:graphicFrame>
             <p:nvGraphicFramePr>
               <p:cNvPr id="6" name="Table 6">
@@ -31347,6 +31557,7 @@
                         <a:bodyPr/>
                         <a:lstStyle/>
                         <a:p>
+                          <a:pPr/>
                           <a14:m>
                             <m:oMathPara xmlns:m="http://schemas.openxmlformats.org/officeDocument/2006/math">
                               <m:oMathParaPr>
@@ -31457,6 +31668,7 @@
                         <a:bodyPr/>
                         <a:lstStyle/>
                         <a:p>
+                          <a:pPr/>
                           <a14:m>
                             <m:oMathPara xmlns:m="http://schemas.openxmlformats.org/officeDocument/2006/math">
                               <m:oMathParaPr>
@@ -31586,6 +31798,7 @@
                         <a:bodyPr/>
                         <a:lstStyle/>
                         <a:p>
+                          <a:pPr/>
                           <a14:m>
                             <m:oMathPara xmlns:m="http://schemas.openxmlformats.org/officeDocument/2006/math">
                               <m:oMathParaPr>
@@ -31714,7 +31927,7 @@
             </a:graphic>
           </p:graphicFrame>
         </mc:Choice>
-        <mc:Fallback>
+        <mc:Fallback xmlns="">
           <p:graphicFrame>
             <p:nvGraphicFramePr>
               <p:cNvPr id="6" name="Table 6">
@@ -32168,8 +32381,8 @@
           <a:chExt cx="0" cy="0"/>
         </a:xfrm>
       </p:grpSpPr>
-      <mc:AlternateContent xmlns:mc="http://schemas.openxmlformats.org/markup-compatibility/2006">
-        <mc:Choice xmlns:a14="http://schemas.microsoft.com/office/drawing/2010/main" Requires="a14">
+      <mc:AlternateContent xmlns:mc="http://schemas.openxmlformats.org/markup-compatibility/2006" xmlns:a14="http://schemas.microsoft.com/office/drawing/2010/main">
+        <mc:Choice Requires="a14">
           <p:sp>
             <p:nvSpPr>
               <p:cNvPr id="2" name="Title 1">
@@ -32231,7 +32444,7 @@
             </p:txBody>
           </p:sp>
         </mc:Choice>
-        <mc:Fallback>
+        <mc:Fallback xmlns="">
           <p:sp>
             <p:nvSpPr>
               <p:cNvPr id="2" name="Title 1">
@@ -32271,8 +32484,8 @@
           </p:sp>
         </mc:Fallback>
       </mc:AlternateContent>
-      <mc:AlternateContent xmlns:mc="http://schemas.openxmlformats.org/markup-compatibility/2006">
-        <mc:Choice xmlns:a14="http://schemas.microsoft.com/office/drawing/2010/main" Requires="a14">
+      <mc:AlternateContent xmlns:mc="http://schemas.openxmlformats.org/markup-compatibility/2006" xmlns:a14="http://schemas.microsoft.com/office/drawing/2010/main">
+        <mc:Choice Requires="a14">
           <p:sp>
             <p:nvSpPr>
               <p:cNvPr id="3" name="Content Placeholder 2">
@@ -32449,7 +32662,7 @@
             </p:txBody>
           </p:sp>
         </mc:Choice>
-        <mc:Fallback>
+        <mc:Fallback xmlns="">
           <p:sp>
             <p:nvSpPr>
               <p:cNvPr id="3" name="Content Placeholder 2">
@@ -32518,8 +32731,8 @@
           </a:p>
         </p:txBody>
       </p:sp>
-      <mc:AlternateContent xmlns:mc="http://schemas.openxmlformats.org/markup-compatibility/2006">
-        <mc:Choice xmlns:a14="http://schemas.microsoft.com/office/drawing/2010/main" Requires="a14">
+      <mc:AlternateContent xmlns:mc="http://schemas.openxmlformats.org/markup-compatibility/2006" xmlns:a14="http://schemas.microsoft.com/office/drawing/2010/main">
+        <mc:Choice Requires="a14">
           <p:graphicFrame>
             <p:nvGraphicFramePr>
               <p:cNvPr id="6" name="Table 6">
@@ -32601,6 +32814,7 @@
                         <a:bodyPr/>
                         <a:lstStyle/>
                         <a:p>
+                          <a:pPr/>
                           <a14:m>
                             <m:oMathPara xmlns:m="http://schemas.openxmlformats.org/officeDocument/2006/math">
                               <m:oMathParaPr>
@@ -32711,6 +32925,7 @@
                         <a:bodyPr/>
                         <a:lstStyle/>
                         <a:p>
+                          <a:pPr/>
                           <a14:m>
                             <m:oMathPara xmlns:m="http://schemas.openxmlformats.org/officeDocument/2006/math">
                               <m:oMathParaPr>
@@ -32840,6 +33055,7 @@
                         <a:bodyPr/>
                         <a:lstStyle/>
                         <a:p>
+                          <a:pPr/>
                           <a14:m>
                             <m:oMathPara xmlns:m="http://schemas.openxmlformats.org/officeDocument/2006/math">
                               <m:oMathParaPr>
@@ -32968,7 +33184,7 @@
             </a:graphic>
           </p:graphicFrame>
         </mc:Choice>
-        <mc:Fallback>
+        <mc:Fallback xmlns="">
           <p:graphicFrame>
             <p:nvGraphicFramePr>
               <p:cNvPr id="6" name="Table 6">
@@ -33416,6 +33632,474 @@
           <a:chExt cx="0" cy="0"/>
         </a:xfrm>
       </p:grpSpPr>
+      <p:sp>
+        <p:nvSpPr>
+          <p:cNvPr id="2" name="Title 1">
+            <a:extLst>
+              <a:ext uri="{FF2B5EF4-FFF2-40B4-BE49-F238E27FC236}">
+                <a16:creationId xmlns:a16="http://schemas.microsoft.com/office/drawing/2014/main" id="{6E7D4A57-A301-4BC1-991A-798B9F1C7C0C}"/>
+              </a:ext>
+            </a:extLst>
+          </p:cNvPr>
+          <p:cNvSpPr>
+            <a:spLocks noGrp="1"/>
+          </p:cNvSpPr>
+          <p:nvPr>
+            <p:ph type="title"/>
+          </p:nvPr>
+        </p:nvSpPr>
+        <p:spPr/>
+        <p:txBody>
+          <a:bodyPr/>
+          <a:lstStyle/>
+          <a:p>
+            <a:r>
+              <a:rPr lang="en-US" dirty="0"/>
+              <a:t>Example in 2D</a:t>
+            </a:r>
+          </a:p>
+        </p:txBody>
+      </p:sp>
+      <mc:AlternateContent xmlns:mc="http://schemas.openxmlformats.org/markup-compatibility/2006">
+        <mc:Choice xmlns:a14="http://schemas.microsoft.com/office/drawing/2010/main" Requires="a14">
+          <p:sp>
+            <p:nvSpPr>
+              <p:cNvPr id="3" name="Content Placeholder 2">
+                <a:extLst>
+                  <a:ext uri="{FF2B5EF4-FFF2-40B4-BE49-F238E27FC236}">
+                    <a16:creationId xmlns:a16="http://schemas.microsoft.com/office/drawing/2014/main" id="{C38DB42F-86B0-4AEA-B746-138C5AF842AA}"/>
+                  </a:ext>
+                </a:extLst>
+              </p:cNvPr>
+              <p:cNvSpPr>
+                <a:spLocks noGrp="1"/>
+              </p:cNvSpPr>
+              <p:nvPr>
+                <p:ph idx="1"/>
+              </p:nvPr>
+            </p:nvSpPr>
+            <p:spPr>
+              <a:xfrm>
+                <a:off x="7083188" y="1539277"/>
+                <a:ext cx="4072492" cy="4329817"/>
+              </a:xfrm>
+            </p:spPr>
+            <p:txBody>
+              <a:bodyPr/>
+              <a:lstStyle/>
+              <a:p>
+                <a:r>
+                  <a:rPr lang="en-US" dirty="0"/>
+                  <a:t>Example:</a:t>
+                </a:r>
+              </a:p>
+              <a:p>
+                <a:pPr lvl="1"/>
+                <a:r>
+                  <a:rPr lang="en-US" dirty="0"/>
+                  <a:t>10 data points with binary labels</a:t>
+                </a:r>
+              </a:p>
+              <a:p>
+                <a:pPr lvl="1"/>
+                <a:r>
+                  <a:rPr lang="en-US" dirty="0"/>
+                  <a:t>Fit SVM with </a:t>
+                </a:r>
+                <a14:m>
+                  <m:oMath xmlns:m="http://schemas.openxmlformats.org/officeDocument/2006/math">
+                    <m:r>
+                      <a:rPr lang="en-US" b="0" i="1" smtClean="0">
+                        <a:latin typeface="Cambria Math" panose="02040503050406030204" pitchFamily="18" charset="0"/>
+                      </a:rPr>
+                      <m:t>𝐶</m:t>
+                    </m:r>
+                    <m:r>
+                      <a:rPr lang="en-US" b="0" i="1" smtClean="0">
+                        <a:latin typeface="Cambria Math" panose="02040503050406030204" pitchFamily="18" charset="0"/>
+                      </a:rPr>
+                      <m:t>=1</m:t>
+                    </m:r>
+                  </m:oMath>
+                </a14:m>
+                <a:r>
+                  <a:rPr lang="en-US" dirty="0"/>
+                  <a:t> and RBF </a:t>
+                </a:r>
+              </a:p>
+              <a:p>
+                <a:pPr lvl="1"/>
+                <a14:m>
+                  <m:oMath xmlns:m="http://schemas.openxmlformats.org/officeDocument/2006/math">
+                    <m:r>
+                      <a:rPr lang="en-US" b="0" i="1" smtClean="0">
+                        <a:latin typeface="Cambria Math" panose="02040503050406030204" pitchFamily="18" charset="0"/>
+                      </a:rPr>
+                      <m:t>𝛾</m:t>
+                    </m:r>
+                    <m:r>
+                      <a:rPr lang="en-US" b="0" i="1" smtClean="0">
+                        <a:latin typeface="Cambria Math" panose="02040503050406030204" pitchFamily="18" charset="0"/>
+                      </a:rPr>
+                      <m:t>=</m:t>
+                    </m:r>
+                  </m:oMath>
+                </a14:m>
+                <a:r>
+                  <a:rPr lang="en-US" dirty="0"/>
+                  <a:t> 0.3, 3 and 10</a:t>
+                </a:r>
+              </a:p>
+              <a:p>
+                <a:r>
+                  <a:rPr lang="en-US" dirty="0"/>
+                  <a:t>Plot:</a:t>
+                </a:r>
+              </a:p>
+              <a:p>
+                <a:pPr lvl="1"/>
+                <a14:m>
+                  <m:oMath xmlns:m="http://schemas.openxmlformats.org/officeDocument/2006/math">
+                    <m:r>
+                      <a:rPr lang="en-US" b="0" i="1" smtClean="0">
+                        <a:latin typeface="Cambria Math" panose="02040503050406030204" pitchFamily="18" charset="0"/>
+                      </a:rPr>
+                      <m:t>𝑧</m:t>
+                    </m:r>
+                  </m:oMath>
+                </a14:m>
+                <a:r>
+                  <a:rPr lang="en-US" dirty="0"/>
+                  <a:t>= linear discriminant</a:t>
+                </a:r>
+              </a:p>
+              <a:p>
+                <a:pPr lvl="1"/>
+                <a14:m>
+                  <m:oMath xmlns:m="http://schemas.openxmlformats.org/officeDocument/2006/math">
+                    <m:acc>
+                      <m:accPr>
+                        <m:chr m:val="̂"/>
+                        <m:ctrlPr>
+                          <a:rPr lang="en-US" i="1" smtClean="0">
+                            <a:latin typeface="Cambria Math" panose="02040503050406030204" pitchFamily="18" charset="0"/>
+                          </a:rPr>
+                        </m:ctrlPr>
+                      </m:accPr>
+                      <m:e>
+                        <m:r>
+                          <a:rPr lang="en-US" b="0" i="1" smtClean="0">
+                            <a:latin typeface="Cambria Math" panose="02040503050406030204" pitchFamily="18" charset="0"/>
+                          </a:rPr>
+                          <m:t>𝑦</m:t>
+                        </m:r>
+                      </m:e>
+                    </m:acc>
+                    <m:r>
+                      <a:rPr lang="en-US" b="0" i="1" smtClean="0">
+                        <a:latin typeface="Cambria Math" panose="02040503050406030204" pitchFamily="18" charset="0"/>
+                      </a:rPr>
+                      <m:t>=</m:t>
+                    </m:r>
+                    <m:r>
+                      <a:rPr lang="en-US" b="0" i="1" smtClean="0">
+                        <a:latin typeface="Cambria Math" panose="02040503050406030204" pitchFamily="18" charset="0"/>
+                      </a:rPr>
+                      <m:t>𝑠𝑖𝑔𝑛</m:t>
+                    </m:r>
+                    <m:d>
+                      <m:dPr>
+                        <m:ctrlPr>
+                          <a:rPr lang="en-US" b="0" i="1" smtClean="0">
+                            <a:latin typeface="Cambria Math" panose="02040503050406030204" pitchFamily="18" charset="0"/>
+                          </a:rPr>
+                        </m:ctrlPr>
+                      </m:dPr>
+                      <m:e>
+                        <m:r>
+                          <a:rPr lang="en-US" b="0" i="1" smtClean="0">
+                            <a:latin typeface="Cambria Math" panose="02040503050406030204" pitchFamily="18" charset="0"/>
+                          </a:rPr>
+                          <m:t>𝑧</m:t>
+                        </m:r>
+                      </m:e>
+                    </m:d>
+                    <m:r>
+                      <a:rPr lang="en-US" b="0" i="1" smtClean="0">
+                        <a:latin typeface="Cambria Math" panose="02040503050406030204" pitchFamily="18" charset="0"/>
+                      </a:rPr>
+                      <m:t>=</m:t>
+                    </m:r>
+                  </m:oMath>
+                </a14:m>
+                <a:r>
+                  <a:rPr lang="en-US" dirty="0"/>
+                  <a:t> classification decision</a:t>
+                </a:r>
+              </a:p>
+              <a:p>
+                <a:r>
+                  <a:rPr lang="en-US" dirty="0"/>
+                  <a:t>Observe:  As </a:t>
+                </a:r>
+                <a14:m>
+                  <m:oMath xmlns:m="http://schemas.openxmlformats.org/officeDocument/2006/math">
+                    <m:r>
+                      <a:rPr lang="en-US" b="0" i="1" smtClean="0">
+                        <a:latin typeface="Cambria Math" panose="02040503050406030204" pitchFamily="18" charset="0"/>
+                      </a:rPr>
+                      <m:t>𝛾</m:t>
+                    </m:r>
+                  </m:oMath>
+                </a14:m>
+                <a:r>
+                  <a:rPr lang="en-US" dirty="0"/>
+                  <a:t> increases</a:t>
+                </a:r>
+              </a:p>
+              <a:p>
+                <a:pPr lvl="1"/>
+                <a:r>
+                  <a:rPr lang="en-US" dirty="0"/>
+                  <a:t>Fits training data better</a:t>
+                </a:r>
+              </a:p>
+              <a:p>
+                <a:pPr lvl="1"/>
+                <a:r>
+                  <a:rPr lang="en-US" dirty="0"/>
+                  <a:t>More complex decision region</a:t>
+                </a:r>
+              </a:p>
+            </p:txBody>
+          </p:sp>
+        </mc:Choice>
+        <mc:Fallback>
+          <p:sp>
+            <p:nvSpPr>
+              <p:cNvPr id="3" name="Content Placeholder 2">
+                <a:extLst>
+                  <a:ext uri="{FF2B5EF4-FFF2-40B4-BE49-F238E27FC236}">
+                    <a16:creationId xmlns:a16="http://schemas.microsoft.com/office/drawing/2014/main" id="{C38DB42F-86B0-4AEA-B746-138C5AF842AA}"/>
+                  </a:ext>
+                </a:extLst>
+              </p:cNvPr>
+              <p:cNvSpPr>
+                <a:spLocks noGrp="1" noRot="1" noChangeAspect="1" noMove="1" noResize="1" noEditPoints="1" noAdjustHandles="1" noChangeArrowheads="1" noChangeShapeType="1" noTextEdit="1"/>
+              </p:cNvSpPr>
+              <p:nvPr>
+                <p:ph idx="1"/>
+              </p:nvPr>
+            </p:nvSpPr>
+            <p:spPr>
+              <a:xfrm>
+                <a:off x="7083188" y="1539277"/>
+                <a:ext cx="4072492" cy="4329817"/>
+              </a:xfrm>
+              <a:blipFill>
+                <a:blip r:embed="rId2"/>
+                <a:stretch>
+                  <a:fillRect l="-3593" t="-1549"/>
+                </a:stretch>
+              </a:blipFill>
+            </p:spPr>
+            <p:txBody>
+              <a:bodyPr/>
+              <a:lstStyle/>
+              <a:p>
+                <a:r>
+                  <a:rPr lang="en-US">
+                    <a:noFill/>
+                  </a:rPr>
+                  <a:t> </a:t>
+                </a:r>
+              </a:p>
+            </p:txBody>
+          </p:sp>
+        </mc:Fallback>
+      </mc:AlternateContent>
+      <p:sp>
+        <p:nvSpPr>
+          <p:cNvPr id="4" name="Slide Number Placeholder 3">
+            <a:extLst>
+              <a:ext uri="{FF2B5EF4-FFF2-40B4-BE49-F238E27FC236}">
+                <a16:creationId xmlns:a16="http://schemas.microsoft.com/office/drawing/2014/main" id="{A6F6A158-997B-4602-B639-D2CCA89C7F21}"/>
+              </a:ext>
+            </a:extLst>
+          </p:cNvPr>
+          <p:cNvSpPr>
+            <a:spLocks noGrp="1"/>
+          </p:cNvSpPr>
+          <p:nvPr>
+            <p:ph type="sldNum" sz="quarter" idx="12"/>
+          </p:nvPr>
+        </p:nvSpPr>
+        <p:spPr/>
+        <p:txBody>
+          <a:bodyPr/>
+          <a:lstStyle/>
+          <a:p>
+            <a:fld id="{629637A9-119A-49DA-BD12-AAC58B377D80}" type="slidenum">
+              <a:rPr lang="en-US" smtClean="0"/>
+              <a:t>43</a:t>
+            </a:fld>
+            <a:endParaRPr lang="en-US" dirty="0"/>
+          </a:p>
+        </p:txBody>
+      </p:sp>
+      <p:pic>
+        <p:nvPicPr>
+          <p:cNvPr id="5" name="Picture 4">
+            <a:extLst>
+              <a:ext uri="{FF2B5EF4-FFF2-40B4-BE49-F238E27FC236}">
+                <a16:creationId xmlns:a16="http://schemas.microsoft.com/office/drawing/2014/main" id="{FFAD286B-6DBA-49EF-9550-7E59150E7A54}"/>
+              </a:ext>
+            </a:extLst>
+          </p:cNvPr>
+          <p:cNvPicPr>
+            <a:picLocks noChangeAspect="1"/>
+          </p:cNvPicPr>
+          <p:nvPr/>
+        </p:nvPicPr>
+        <p:blipFill>
+          <a:blip r:embed="rId3"/>
+          <a:stretch>
+            <a:fillRect/>
+          </a:stretch>
+        </p:blipFill>
+        <p:spPr>
+          <a:xfrm>
+            <a:off x="782782" y="1877290"/>
+            <a:ext cx="5832940" cy="3783157"/>
+          </a:xfrm>
+          <a:prstGeom prst="rect">
+            <a:avLst/>
+          </a:prstGeom>
+        </p:spPr>
+      </p:pic>
+      <p:sp>
+        <p:nvSpPr>
+          <p:cNvPr id="6" name="TextBox 5">
+            <a:extLst>
+              <a:ext uri="{FF2B5EF4-FFF2-40B4-BE49-F238E27FC236}">
+                <a16:creationId xmlns:a16="http://schemas.microsoft.com/office/drawing/2014/main" id="{A4D46C08-4E16-4FAE-8E70-7D633E6EAF16}"/>
+              </a:ext>
+            </a:extLst>
+          </p:cNvPr>
+          <p:cNvSpPr txBox="1"/>
+          <p:nvPr/>
+        </p:nvSpPr>
+        <p:spPr>
+          <a:xfrm>
+            <a:off x="1480782" y="1539277"/>
+            <a:ext cx="1818126" cy="369332"/>
+          </a:xfrm>
+          <a:prstGeom prst="rect">
+            <a:avLst/>
+          </a:prstGeom>
+          <a:noFill/>
+        </p:spPr>
+        <p:txBody>
+          <a:bodyPr wrap="none" rtlCol="0">
+            <a:spAutoFit/>
+          </a:bodyPr>
+          <a:lstStyle/>
+          <a:p>
+            <a:r>
+              <a:rPr lang="en-US" dirty="0">
+                <a:solidFill>
+                  <a:schemeClr val="accent5">
+                    <a:lumMod val="75000"/>
+                  </a:schemeClr>
+                </a:solidFill>
+              </a:rPr>
+              <a:t>Decision function</a:t>
+            </a:r>
+          </a:p>
+        </p:txBody>
+      </p:sp>
+      <p:sp>
+        <p:nvSpPr>
+          <p:cNvPr id="8" name="TextBox 7">
+            <a:extLst>
+              <a:ext uri="{FF2B5EF4-FFF2-40B4-BE49-F238E27FC236}">
+                <a16:creationId xmlns:a16="http://schemas.microsoft.com/office/drawing/2014/main" id="{B37EE7BA-A3FF-4F19-97AF-3DA0D187A251}"/>
+              </a:ext>
+            </a:extLst>
+          </p:cNvPr>
+          <p:cNvSpPr txBox="1"/>
+          <p:nvPr/>
+        </p:nvSpPr>
+        <p:spPr>
+          <a:xfrm>
+            <a:off x="3699252" y="1539277"/>
+            <a:ext cx="1458220" cy="369332"/>
+          </a:xfrm>
+          <a:prstGeom prst="rect">
+            <a:avLst/>
+          </a:prstGeom>
+          <a:noFill/>
+        </p:spPr>
+        <p:txBody>
+          <a:bodyPr wrap="none" rtlCol="0">
+            <a:spAutoFit/>
+          </a:bodyPr>
+          <a:lstStyle/>
+          <a:p>
+            <a:r>
+              <a:rPr lang="en-US" dirty="0">
+                <a:solidFill>
+                  <a:schemeClr val="accent5">
+                    <a:lumMod val="75000"/>
+                  </a:schemeClr>
+                </a:solidFill>
+              </a:rPr>
+              <a:t>Classification</a:t>
+            </a:r>
+            <a:r>
+              <a:rPr lang="en-US" dirty="0">
+                <a:solidFill>
+                  <a:schemeClr val="accent1">
+                    <a:lumMod val="60000"/>
+                    <a:lumOff val="40000"/>
+                  </a:schemeClr>
+                </a:solidFill>
+              </a:rPr>
+              <a:t> </a:t>
+            </a:r>
+          </a:p>
+        </p:txBody>
+      </p:sp>
+    </p:spTree>
+    <p:extLst>
+      <p:ext uri="{BB962C8B-B14F-4D97-AF65-F5344CB8AC3E}">
+        <p14:creationId xmlns:p14="http://schemas.microsoft.com/office/powerpoint/2010/main" val="3030445269"/>
+      </p:ext>
+    </p:extLst>
+  </p:cSld>
+  <p:clrMapOvr>
+    <a:masterClrMapping/>
+  </p:clrMapOvr>
+</p:sld>
+</file>
+
+<file path=ppt/slides/slide44.xml><?xml version="1.0" encoding="utf-8"?>
+<p:sld xmlns:a="http://schemas.openxmlformats.org/drawingml/2006/main" xmlns:r="http://schemas.openxmlformats.org/officeDocument/2006/relationships" xmlns:p="http://schemas.openxmlformats.org/presentationml/2006/main">
+  <p:cSld>
+    <p:spTree>
+      <p:nvGrpSpPr>
+        <p:cNvPr id="1" name=""/>
+        <p:cNvGrpSpPr/>
+        <p:nvPr/>
+      </p:nvGrpSpPr>
+      <p:grpSpPr>
+        <a:xfrm>
+          <a:off x="0" y="0"/>
+          <a:ext cx="0" cy="0"/>
+          <a:chOff x="0" y="0"/>
+          <a:chExt cx="0" cy="0"/>
+        </a:xfrm>
+      </p:grpSpPr>
       <p:pic>
         <p:nvPicPr>
           <p:cNvPr id="6146" name="Picture 2" descr="http://1.bp.blogspot.com/_UpN7DfJA0j4/TJs87kbBv7I/AAAAAAAAABQ/bGcjhdxHeqk/s320/mnist_train_10000_-1_1.svm_.png"/>
@@ -33732,7 +34416,7 @@
           <a:p>
             <a:fld id="{629637A9-119A-49DA-BD12-AAC58B377D80}" type="slidenum">
               <a:rPr lang="en-US" smtClean="0"/>
-              <a:t>43</a:t>
+              <a:t>44</a:t>
             </a:fld>
             <a:endParaRPr lang="en-US" dirty="0"/>
           </a:p>
@@ -33780,7 +34464,7 @@
 </p:sld>
 </file>
 
-<file path=ppt/slides/slide44.xml><?xml version="1.0" encoding="utf-8"?>
+<file path=ppt/slides/slide45.xml><?xml version="1.0" encoding="utf-8"?>
 <p:sld xmlns:a="http://schemas.openxmlformats.org/drawingml/2006/main" xmlns:r="http://schemas.openxmlformats.org/officeDocument/2006/relationships" xmlns:p="http://schemas.openxmlformats.org/presentationml/2006/main">
   <p:cSld>
     <p:spTree>
@@ -34087,7 +34771,7 @@
           <a:p>
             <a:fld id="{629637A9-119A-49DA-BD12-AAC58B377D80}" type="slidenum">
               <a:rPr lang="en-US" smtClean="0"/>
-              <a:t>44</a:t>
+              <a:t>45</a:t>
             </a:fld>
             <a:endParaRPr lang="en-US" dirty="0"/>
           </a:p>
@@ -34106,7 +34790,7 @@
 </p:sld>
 </file>
 
-<file path=ppt/slides/slide45.xml><?xml version="1.0" encoding="utf-8"?>
+<file path=ppt/slides/slide46.xml><?xml version="1.0" encoding="utf-8"?>
 <p:sld xmlns:a="http://schemas.openxmlformats.org/drawingml/2006/main" xmlns:r="http://schemas.openxmlformats.org/officeDocument/2006/relationships" xmlns:p="http://schemas.openxmlformats.org/presentationml/2006/main">
   <p:cSld>
     <p:spTree>
@@ -34308,7 +34992,7 @@
           <a:p>
             <a:fld id="{629637A9-119A-49DA-BD12-AAC58B377D80}" type="slidenum">
               <a:rPr lang="en-US" smtClean="0"/>
-              <a:t>45</a:t>
+              <a:t>46</a:t>
             </a:fld>
             <a:endParaRPr lang="en-US" dirty="0"/>
           </a:p>
@@ -34423,7 +35107,7 @@
 </p:sld>
 </file>
 
-<file path=ppt/slides/slide46.xml><?xml version="1.0" encoding="utf-8"?>
+<file path=ppt/slides/slide47.xml><?xml version="1.0" encoding="utf-8"?>
 <p:sld xmlns:a="http://schemas.openxmlformats.org/drawingml/2006/main" xmlns:r="http://schemas.openxmlformats.org/officeDocument/2006/relationships" xmlns:p="http://schemas.openxmlformats.org/presentationml/2006/main">
   <p:cSld>
     <p:spTree>
@@ -34506,7 +35190,7 @@
           <a:p>
             <a:fld id="{629637A9-119A-49DA-BD12-AAC58B377D80}" type="slidenum">
               <a:rPr lang="en-US" smtClean="0"/>
-              <a:t>46</a:t>
+              <a:t>47</a:t>
             </a:fld>
             <a:endParaRPr lang="en-US" dirty="0"/>
           </a:p>
@@ -34549,7 +35233,7 @@
 </p:sld>
 </file>
 
-<file path=ppt/slides/slide47.xml><?xml version="1.0" encoding="utf-8"?>
+<file path=ppt/slides/slide48.xml><?xml version="1.0" encoding="utf-8"?>
 <p:sld xmlns:a="http://schemas.openxmlformats.org/drawingml/2006/main" xmlns:r="http://schemas.openxmlformats.org/officeDocument/2006/relationships" xmlns:p="http://schemas.openxmlformats.org/presentationml/2006/main">
   <p:cSld>
     <p:spTree>
@@ -34658,7 +35342,7 @@
           <a:p>
             <a:fld id="{629637A9-119A-49DA-BD12-AAC58B377D80}" type="slidenum">
               <a:rPr lang="en-US" smtClean="0"/>
-              <a:t>47</a:t>
+              <a:t>48</a:t>
             </a:fld>
             <a:endParaRPr lang="en-US" dirty="0"/>
           </a:p>
@@ -34723,7 +35407,7 @@
 </p:sld>
 </file>
 
-<file path=ppt/slides/slide48.xml><?xml version="1.0" encoding="utf-8"?>
+<file path=ppt/slides/slide49.xml><?xml version="1.0" encoding="utf-8"?>
 <p:sld xmlns:a="http://schemas.openxmlformats.org/drawingml/2006/main" xmlns:r="http://schemas.openxmlformats.org/officeDocument/2006/relationships" xmlns:p="http://schemas.openxmlformats.org/presentationml/2006/main">
   <p:cSld>
     <p:spTree>
@@ -35247,7 +35931,7 @@
           <a:p>
             <a:fld id="{629637A9-119A-49DA-BD12-AAC58B377D80}" type="slidenum">
               <a:rPr lang="en-US" smtClean="0"/>
-              <a:t>48</a:t>
+              <a:t>49</a:t>
             </a:fld>
             <a:endParaRPr lang="en-US" dirty="0"/>
           </a:p>
@@ -35257,929 +35941,6 @@
     <p:extLst>
       <p:ext uri="{BB962C8B-B14F-4D97-AF65-F5344CB8AC3E}">
         <p14:creationId xmlns:p14="http://schemas.microsoft.com/office/powerpoint/2010/main" val="3312341847"/>
-      </p:ext>
-    </p:extLst>
-  </p:cSld>
-  <p:clrMapOvr>
-    <a:masterClrMapping/>
-  </p:clrMapOvr>
-</p:sld>
-</file>
-
-<file path=ppt/slides/slide49.xml><?xml version="1.0" encoding="utf-8"?>
-<p:sld xmlns:a="http://schemas.openxmlformats.org/drawingml/2006/main" xmlns:r="http://schemas.openxmlformats.org/officeDocument/2006/relationships" xmlns:p="http://schemas.openxmlformats.org/presentationml/2006/main">
-  <p:cSld>
-    <p:spTree>
-      <p:nvGrpSpPr>
-        <p:cNvPr id="1" name=""/>
-        <p:cNvGrpSpPr/>
-        <p:nvPr/>
-      </p:nvGrpSpPr>
-      <p:grpSpPr>
-        <a:xfrm>
-          <a:off x="0" y="0"/>
-          <a:ext cx="0" cy="0"/>
-          <a:chOff x="0" y="0"/>
-          <a:chExt cx="0" cy="0"/>
-        </a:xfrm>
-      </p:grpSpPr>
-      <p:sp>
-        <p:nvSpPr>
-          <p:cNvPr id="2" name="Title 1"/>
-          <p:cNvSpPr>
-            <a:spLocks noGrp="1"/>
-          </p:cNvSpPr>
-          <p:nvPr>
-            <p:ph type="title"/>
-          </p:nvPr>
-        </p:nvSpPr>
-        <p:spPr/>
-        <p:txBody>
-          <a:bodyPr/>
-          <a:lstStyle/>
-          <a:p>
-            <a:r>
-              <a:rPr lang="en-US" dirty="0" err="1"/>
-              <a:t>Lagrangian</a:t>
-            </a:r>
-            <a:endParaRPr lang="en-US" dirty="0"/>
-          </a:p>
-        </p:txBody>
-      </p:sp>
-      <mc:AlternateContent xmlns:mc="http://schemas.openxmlformats.org/markup-compatibility/2006" xmlns:a14="http://schemas.microsoft.com/office/drawing/2010/main">
-        <mc:Choice Requires="a14">
-          <p:sp>
-            <p:nvSpPr>
-              <p:cNvPr id="3" name="Content Placeholder 2"/>
-              <p:cNvSpPr>
-                <a:spLocks noGrp="1"/>
-              </p:cNvSpPr>
-              <p:nvPr>
-                <p:ph idx="1"/>
-              </p:nvPr>
-            </p:nvSpPr>
-            <p:spPr/>
-            <p:txBody>
-              <a:bodyPr/>
-              <a:lstStyle/>
-              <a:p>
-                <a:r>
-                  <a:rPr lang="en-US" dirty="0"/>
-                  <a:t>Constrained optimization: Min </a:t>
-                </a:r>
-                <a14:m>
-                  <m:oMath xmlns:m="http://schemas.openxmlformats.org/officeDocument/2006/math">
-                    <m:r>
-                      <a:rPr lang="en-US" i="1">
-                        <a:latin typeface="Cambria Math" panose="02040503050406030204" pitchFamily="18" charset="0"/>
-                      </a:rPr>
-                      <m:t>𝑓</m:t>
-                    </m:r>
-                    <m:d>
-                      <m:dPr>
-                        <m:ctrlPr>
-                          <a:rPr lang="en-US" i="1">
-                            <a:latin typeface="Cambria Math" panose="02040503050406030204" pitchFamily="18" charset="0"/>
-                          </a:rPr>
-                        </m:ctrlPr>
-                      </m:dPr>
-                      <m:e>
-                        <m:r>
-                          <a:rPr lang="en-US" b="1" i="1">
-                            <a:latin typeface="Cambria Math" panose="02040503050406030204" pitchFamily="18" charset="0"/>
-                          </a:rPr>
-                          <m:t>𝒘</m:t>
-                        </m:r>
-                      </m:e>
-                    </m:d>
-                    <m:r>
-                      <a:rPr lang="en-US" b="1" i="1">
-                        <a:latin typeface="Cambria Math" panose="02040503050406030204" pitchFamily="18" charset="0"/>
-                      </a:rPr>
-                      <m:t> </m:t>
-                    </m:r>
-                    <m:r>
-                      <m:rPr>
-                        <m:nor/>
-                      </m:rPr>
-                      <a:rPr lang="en-US" b="1" i="0">
-                        <a:latin typeface="Cambria Math" panose="02040503050406030204" pitchFamily="18" charset="0"/>
-                      </a:rPr>
-                      <m:t> </m:t>
-                    </m:r>
-                    <m:r>
-                      <m:rPr>
-                        <m:nor/>
-                      </m:rPr>
-                      <a:rPr lang="en-US" i="0">
-                        <a:latin typeface="Cambria Math" panose="02040503050406030204" pitchFamily="18" charset="0"/>
-                      </a:rPr>
-                      <m:t>s</m:t>
-                    </m:r>
-                    <m:r>
-                      <m:rPr>
-                        <m:nor/>
-                      </m:rPr>
-                      <a:rPr lang="en-US" i="0">
-                        <a:latin typeface="Cambria Math" panose="02040503050406030204" pitchFamily="18" charset="0"/>
-                      </a:rPr>
-                      <m:t>.</m:t>
-                    </m:r>
-                    <m:r>
-                      <m:rPr>
-                        <m:nor/>
-                      </m:rPr>
-                      <a:rPr lang="en-US" i="0">
-                        <a:latin typeface="Cambria Math" panose="02040503050406030204" pitchFamily="18" charset="0"/>
-                      </a:rPr>
-                      <m:t>t</m:t>
-                    </m:r>
-                    <m:r>
-                      <m:rPr>
-                        <m:nor/>
-                      </m:rPr>
-                      <a:rPr lang="en-US" i="0">
-                        <a:latin typeface="Cambria Math" panose="02040503050406030204" pitchFamily="18" charset="0"/>
-                      </a:rPr>
-                      <m:t>.</m:t>
-                    </m:r>
-                    <m:r>
-                      <a:rPr lang="en-US" i="1">
-                        <a:latin typeface="Cambria Math" panose="02040503050406030204" pitchFamily="18" charset="0"/>
-                      </a:rPr>
-                      <m:t>  </m:t>
-                    </m:r>
-                    <m:r>
-                      <a:rPr lang="en-US" i="1">
-                        <a:latin typeface="Cambria Math" panose="02040503050406030204" pitchFamily="18" charset="0"/>
-                      </a:rPr>
-                      <m:t>𝑔</m:t>
-                    </m:r>
-                    <m:d>
-                      <m:dPr>
-                        <m:ctrlPr>
-                          <a:rPr lang="en-US" i="1">
-                            <a:latin typeface="Cambria Math" panose="02040503050406030204" pitchFamily="18" charset="0"/>
-                          </a:rPr>
-                        </m:ctrlPr>
-                      </m:dPr>
-                      <m:e>
-                        <m:r>
-                          <a:rPr lang="en-US" b="1" i="1">
-                            <a:latin typeface="Cambria Math" panose="02040503050406030204" pitchFamily="18" charset="0"/>
-                          </a:rPr>
-                          <m:t>𝒘</m:t>
-                        </m:r>
-                      </m:e>
-                    </m:d>
-                    <m:r>
-                      <a:rPr lang="en-US" i="1">
-                        <a:latin typeface="Cambria Math" panose="02040503050406030204" pitchFamily="18" charset="0"/>
-                      </a:rPr>
-                      <m:t>≤0</m:t>
-                    </m:r>
-                  </m:oMath>
-                </a14:m>
-                <a:endParaRPr lang="en-US" dirty="0"/>
-              </a:p>
-              <a:p>
-                <a:r>
-                  <a:rPr lang="en-US" dirty="0"/>
-                  <a:t>Consider first a single constraint:  </a:t>
-                </a:r>
-                <a14:m>
-                  <m:oMath xmlns:m="http://schemas.openxmlformats.org/officeDocument/2006/math">
-                    <m:r>
-                      <a:rPr lang="en-US" i="1">
-                        <a:latin typeface="Cambria Math" panose="02040503050406030204" pitchFamily="18" charset="0"/>
-                      </a:rPr>
-                      <m:t>𝑔</m:t>
-                    </m:r>
-                    <m:d>
-                      <m:dPr>
-                        <m:ctrlPr>
-                          <a:rPr lang="en-US" i="1">
-                            <a:latin typeface="Cambria Math" panose="02040503050406030204" pitchFamily="18" charset="0"/>
-                          </a:rPr>
-                        </m:ctrlPr>
-                      </m:dPr>
-                      <m:e>
-                        <m:r>
-                          <a:rPr lang="en-US" b="1" i="1">
-                            <a:latin typeface="Cambria Math" panose="02040503050406030204" pitchFamily="18" charset="0"/>
-                          </a:rPr>
-                          <m:t>𝒘</m:t>
-                        </m:r>
-                      </m:e>
-                    </m:d>
-                  </m:oMath>
-                </a14:m>
-                <a:r>
-                  <a:rPr lang="en-US" dirty="0"/>
-                  <a:t> is a scalar </a:t>
-                </a:r>
-              </a:p>
-              <a:p>
-                <a:r>
-                  <a:rPr lang="en-US" dirty="0"/>
-                  <a:t>Define </a:t>
-                </a:r>
-                <a:r>
-                  <a:rPr lang="en-US" dirty="0" err="1">
-                    <a:solidFill>
-                      <a:schemeClr val="accent1">
-                        <a:lumMod val="60000"/>
-                        <a:lumOff val="40000"/>
-                      </a:schemeClr>
-                    </a:solidFill>
-                  </a:rPr>
-                  <a:t>Lagrangian</a:t>
-                </a:r>
-                <a:r>
-                  <a:rPr lang="en-US" dirty="0"/>
-                  <a:t>:   </a:t>
-                </a:r>
-                <a14:m>
-                  <m:oMath xmlns:m="http://schemas.openxmlformats.org/officeDocument/2006/math">
-                    <m:r>
-                      <a:rPr lang="en-US" b="0" i="1" smtClean="0">
-                        <a:latin typeface="Cambria Math" panose="02040503050406030204" pitchFamily="18" charset="0"/>
-                      </a:rPr>
-                      <m:t>𝐿</m:t>
-                    </m:r>
-                    <m:d>
-                      <m:dPr>
-                        <m:ctrlPr>
-                          <a:rPr lang="en-US" b="0" i="1" smtClean="0">
-                            <a:latin typeface="Cambria Math" panose="02040503050406030204" pitchFamily="18" charset="0"/>
-                          </a:rPr>
-                        </m:ctrlPr>
-                      </m:dPr>
-                      <m:e>
-                        <m:r>
-                          <a:rPr lang="en-US" b="1" i="1" smtClean="0">
-                            <a:latin typeface="Cambria Math" panose="02040503050406030204" pitchFamily="18" charset="0"/>
-                          </a:rPr>
-                          <m:t>𝒘</m:t>
-                        </m:r>
-                        <m:r>
-                          <a:rPr lang="en-US" b="0" i="1" smtClean="0">
-                            <a:latin typeface="Cambria Math" panose="02040503050406030204" pitchFamily="18" charset="0"/>
-                          </a:rPr>
-                          <m:t>,</m:t>
-                        </m:r>
-                        <m:r>
-                          <a:rPr lang="en-US" b="0" i="1" smtClean="0">
-                            <a:latin typeface="Cambria Math" panose="02040503050406030204" pitchFamily="18" charset="0"/>
-                          </a:rPr>
-                          <m:t>𝜆</m:t>
-                        </m:r>
-                      </m:e>
-                    </m:d>
-                    <m:r>
-                      <a:rPr lang="en-US" b="0" i="1" smtClean="0">
-                        <a:latin typeface="Cambria Math" panose="02040503050406030204" pitchFamily="18" charset="0"/>
-                      </a:rPr>
-                      <m:t>=</m:t>
-                    </m:r>
-                    <m:r>
-                      <a:rPr lang="en-US" b="0" i="1" smtClean="0">
-                        <a:latin typeface="Cambria Math" panose="02040503050406030204" pitchFamily="18" charset="0"/>
-                      </a:rPr>
-                      <m:t>𝑓</m:t>
-                    </m:r>
-                    <m:d>
-                      <m:dPr>
-                        <m:ctrlPr>
-                          <a:rPr lang="en-US" b="0" i="1" smtClean="0">
-                            <a:latin typeface="Cambria Math" panose="02040503050406030204" pitchFamily="18" charset="0"/>
-                          </a:rPr>
-                        </m:ctrlPr>
-                      </m:dPr>
-                      <m:e>
-                        <m:r>
-                          <a:rPr lang="en-US" b="1" i="1" smtClean="0">
-                            <a:latin typeface="Cambria Math" panose="02040503050406030204" pitchFamily="18" charset="0"/>
-                          </a:rPr>
-                          <m:t>𝒘</m:t>
-                        </m:r>
-                      </m:e>
-                    </m:d>
-                    <m:r>
-                      <a:rPr lang="en-US" b="0" i="1" smtClean="0">
-                        <a:latin typeface="Cambria Math" panose="02040503050406030204" pitchFamily="18" charset="0"/>
-                      </a:rPr>
-                      <m:t>+</m:t>
-                    </m:r>
-                    <m:r>
-                      <a:rPr lang="en-US" b="0" i="1" smtClean="0">
-                        <a:latin typeface="Cambria Math" panose="02040503050406030204" pitchFamily="18" charset="0"/>
-                      </a:rPr>
-                      <m:t>𝜆</m:t>
-                    </m:r>
-                    <m:r>
-                      <a:rPr lang="en-US" b="0" i="1" smtClean="0">
-                        <a:latin typeface="Cambria Math" panose="02040503050406030204" pitchFamily="18" charset="0"/>
-                      </a:rPr>
-                      <m:t>𝑔</m:t>
-                    </m:r>
-                    <m:d>
-                      <m:dPr>
-                        <m:ctrlPr>
-                          <a:rPr lang="en-US" b="0" i="1" smtClean="0">
-                            <a:latin typeface="Cambria Math" panose="02040503050406030204" pitchFamily="18" charset="0"/>
-                          </a:rPr>
-                        </m:ctrlPr>
-                      </m:dPr>
-                      <m:e>
-                        <m:r>
-                          <a:rPr lang="en-US" b="1" i="1" smtClean="0">
-                            <a:latin typeface="Cambria Math" panose="02040503050406030204" pitchFamily="18" charset="0"/>
-                          </a:rPr>
-                          <m:t>𝒘</m:t>
-                        </m:r>
-                      </m:e>
-                    </m:d>
-                  </m:oMath>
-                </a14:m>
-                <a:endParaRPr lang="en-US" b="0" dirty="0"/>
-              </a:p>
-              <a:p>
-                <a:pPr lvl="1"/>
-                <a14:m>
-                  <m:oMath xmlns:m="http://schemas.openxmlformats.org/officeDocument/2006/math">
-                    <m:r>
-                      <a:rPr lang="en-US" b="1" i="1">
-                        <a:latin typeface="Cambria Math" panose="02040503050406030204" pitchFamily="18" charset="0"/>
-                      </a:rPr>
-                      <m:t>𝒘</m:t>
-                    </m:r>
-                  </m:oMath>
-                </a14:m>
-                <a:r>
-                  <a:rPr lang="en-US" dirty="0"/>
-                  <a:t> is called the </a:t>
-                </a:r>
-                <a:r>
-                  <a:rPr lang="en-US" dirty="0">
-                    <a:solidFill>
-                      <a:schemeClr val="accent1">
-                        <a:lumMod val="60000"/>
-                        <a:lumOff val="40000"/>
-                      </a:schemeClr>
-                    </a:solidFill>
-                  </a:rPr>
-                  <a:t>primal</a:t>
-                </a:r>
-                <a:r>
-                  <a:rPr lang="en-US" dirty="0"/>
-                  <a:t> variable</a:t>
-                </a:r>
-              </a:p>
-              <a:p>
-                <a:pPr lvl="1"/>
-                <a14:m>
-                  <m:oMath xmlns:m="http://schemas.openxmlformats.org/officeDocument/2006/math">
-                    <m:r>
-                      <a:rPr lang="en-US" b="0" i="1" smtClean="0">
-                        <a:latin typeface="Cambria Math" panose="02040503050406030204" pitchFamily="18" charset="0"/>
-                      </a:rPr>
-                      <m:t>𝜆</m:t>
-                    </m:r>
-                  </m:oMath>
-                </a14:m>
-                <a:r>
-                  <a:rPr lang="en-US" dirty="0"/>
-                  <a:t> is called the </a:t>
-                </a:r>
-                <a:r>
-                  <a:rPr lang="en-US" dirty="0">
-                    <a:solidFill>
-                      <a:schemeClr val="accent1">
-                        <a:lumMod val="60000"/>
-                        <a:lumOff val="40000"/>
-                      </a:schemeClr>
-                    </a:solidFill>
-                  </a:rPr>
-                  <a:t>dual</a:t>
-                </a:r>
-                <a:r>
-                  <a:rPr lang="en-US" dirty="0"/>
-                  <a:t> variable</a:t>
-                </a:r>
-              </a:p>
-              <a:p>
-                <a:r>
-                  <a:rPr lang="en-US" dirty="0">
-                    <a:solidFill>
-                      <a:schemeClr val="tx2">
-                        <a:lumMod val="60000"/>
-                        <a:lumOff val="40000"/>
-                      </a:schemeClr>
-                    </a:solidFill>
-                  </a:rPr>
-                  <a:t>Dual minimization</a:t>
-                </a:r>
-                <a:r>
-                  <a:rPr lang="en-US" dirty="0"/>
-                  <a:t>:  Given a dual parameter </a:t>
-                </a:r>
-                <a14:m>
-                  <m:oMath xmlns:m="http://schemas.openxmlformats.org/officeDocument/2006/math">
-                    <m:r>
-                      <a:rPr lang="en-US" i="1">
-                        <a:latin typeface="Cambria Math" panose="02040503050406030204" pitchFamily="18" charset="0"/>
-                      </a:rPr>
-                      <m:t>𝜆</m:t>
-                    </m:r>
-                  </m:oMath>
-                </a14:m>
-                <a:r>
-                  <a:rPr lang="en-US" dirty="0"/>
-                  <a:t>, minimize</a:t>
-                </a:r>
-                <a:br>
-                  <a:rPr lang="en-US" dirty="0"/>
-                </a:br>
-                <a:br>
-                  <a:rPr lang="en-US" dirty="0"/>
-                </a:br>
-                <a14:m>
-                  <m:oMath xmlns:m="http://schemas.openxmlformats.org/officeDocument/2006/math">
-                    <m:acc>
-                      <m:accPr>
-                        <m:chr m:val="̂"/>
-                        <m:ctrlPr>
-                          <a:rPr lang="en-US" i="1" smtClean="0">
-                            <a:latin typeface="Cambria Math" panose="02040503050406030204" pitchFamily="18" charset="0"/>
-                          </a:rPr>
-                        </m:ctrlPr>
-                      </m:accPr>
-                      <m:e>
-                        <m:r>
-                          <a:rPr lang="en-US" b="1" i="1" smtClean="0">
-                            <a:latin typeface="Cambria Math" panose="02040503050406030204" pitchFamily="18" charset="0"/>
-                          </a:rPr>
-                          <m:t>𝒘</m:t>
-                        </m:r>
-                      </m:e>
-                    </m:acc>
-                    <m:d>
-                      <m:dPr>
-                        <m:ctrlPr>
-                          <a:rPr lang="en-US" b="0" i="1" smtClean="0">
-                            <a:latin typeface="Cambria Math" panose="02040503050406030204" pitchFamily="18" charset="0"/>
-                          </a:rPr>
-                        </m:ctrlPr>
-                      </m:dPr>
-                      <m:e>
-                        <m:r>
-                          <a:rPr lang="en-US" b="0" i="1" smtClean="0">
-                            <a:latin typeface="Cambria Math" panose="02040503050406030204" pitchFamily="18" charset="0"/>
-                          </a:rPr>
-                          <m:t>𝜆</m:t>
-                        </m:r>
-                      </m:e>
-                    </m:d>
-                    <m:r>
-                      <a:rPr lang="en-US" b="0" i="1" smtClean="0">
-                        <a:latin typeface="Cambria Math" panose="02040503050406030204" pitchFamily="18" charset="0"/>
-                      </a:rPr>
-                      <m:t>=</m:t>
-                    </m:r>
-                    <m:func>
-                      <m:funcPr>
-                        <m:ctrlPr>
-                          <a:rPr lang="en-US" b="0" i="1" smtClean="0">
-                            <a:latin typeface="Cambria Math" panose="02040503050406030204" pitchFamily="18" charset="0"/>
-                          </a:rPr>
-                        </m:ctrlPr>
-                      </m:funcPr>
-                      <m:fName>
-                        <m:r>
-                          <m:rPr>
-                            <m:sty m:val="p"/>
-                          </m:rPr>
-                          <a:rPr lang="en-US" b="0" i="0" smtClean="0">
-                            <a:latin typeface="Cambria Math" panose="02040503050406030204" pitchFamily="18" charset="0"/>
-                          </a:rPr>
-                          <m:t>arg</m:t>
-                        </m:r>
-                      </m:fName>
-                      <m:e>
-                        <m:func>
-                          <m:funcPr>
-                            <m:ctrlPr>
-                              <a:rPr lang="en-US" b="0" i="1" smtClean="0">
-                                <a:latin typeface="Cambria Math" panose="02040503050406030204" pitchFamily="18" charset="0"/>
-                              </a:rPr>
-                            </m:ctrlPr>
-                          </m:funcPr>
-                          <m:fName>
-                            <m:limLow>
-                              <m:limLowPr>
-                                <m:ctrlPr>
-                                  <a:rPr lang="en-US" b="0" i="1" smtClean="0">
-                                    <a:latin typeface="Cambria Math" panose="02040503050406030204" pitchFamily="18" charset="0"/>
-                                  </a:rPr>
-                                </m:ctrlPr>
-                              </m:limLowPr>
-                              <m:e>
-                                <m:r>
-                                  <m:rPr>
-                                    <m:sty m:val="p"/>
-                                  </m:rPr>
-                                  <a:rPr lang="en-US" b="0" i="0" smtClean="0">
-                                    <a:latin typeface="Cambria Math" panose="02040503050406030204" pitchFamily="18" charset="0"/>
-                                  </a:rPr>
-                                  <m:t>min</m:t>
-                                </m:r>
-                              </m:e>
-                              <m:lim>
-                                <m:r>
-                                  <a:rPr lang="en-US" b="1" i="1" smtClean="0">
-                                    <a:latin typeface="Cambria Math" panose="02040503050406030204" pitchFamily="18" charset="0"/>
-                                  </a:rPr>
-                                  <m:t>𝒘</m:t>
-                                </m:r>
-                              </m:lim>
-                            </m:limLow>
-                          </m:fName>
-                          <m:e>
-                            <m:r>
-                              <a:rPr lang="en-US" b="0" i="1" smtClean="0">
-                                <a:latin typeface="Cambria Math" panose="02040503050406030204" pitchFamily="18" charset="0"/>
-                              </a:rPr>
-                              <m:t>𝐿</m:t>
-                            </m:r>
-                            <m:r>
-                              <a:rPr lang="en-US" b="0" i="1" smtClean="0">
-                                <a:latin typeface="Cambria Math" panose="02040503050406030204" pitchFamily="18" charset="0"/>
-                              </a:rPr>
-                              <m:t>(</m:t>
-                            </m:r>
-                            <m:r>
-                              <a:rPr lang="en-US" b="1" i="1" smtClean="0">
-                                <a:latin typeface="Cambria Math" panose="02040503050406030204" pitchFamily="18" charset="0"/>
-                              </a:rPr>
-                              <m:t>𝒘</m:t>
-                            </m:r>
-                            <m:r>
-                              <a:rPr lang="en-US" b="0" i="1" smtClean="0">
-                                <a:latin typeface="Cambria Math" panose="02040503050406030204" pitchFamily="18" charset="0"/>
-                              </a:rPr>
-                              <m:t>,</m:t>
-                            </m:r>
-                            <m:r>
-                              <a:rPr lang="en-US" b="0" i="1" smtClean="0">
-                                <a:latin typeface="Cambria Math" panose="02040503050406030204" pitchFamily="18" charset="0"/>
-                              </a:rPr>
-                              <m:t>𝜆</m:t>
-                            </m:r>
-                            <m:r>
-                              <a:rPr lang="en-US" b="0" i="1" smtClean="0">
-                                <a:latin typeface="Cambria Math" panose="02040503050406030204" pitchFamily="18" charset="0"/>
-                              </a:rPr>
-                              <m:t>)</m:t>
-                            </m:r>
-                          </m:e>
-                        </m:func>
-                      </m:e>
-                    </m:func>
-                    <m:r>
-                      <a:rPr lang="en-US" b="0" i="1" smtClean="0">
-                        <a:latin typeface="Cambria Math" panose="02040503050406030204" pitchFamily="18" charset="0"/>
-                      </a:rPr>
-                      <m:t>,   </m:t>
-                    </m:r>
-                    <m:sSup>
-                      <m:sSupPr>
-                        <m:ctrlPr>
-                          <a:rPr lang="en-US" b="0" i="1" smtClean="0">
-                            <a:latin typeface="Cambria Math" panose="02040503050406030204" pitchFamily="18" charset="0"/>
-                          </a:rPr>
-                        </m:ctrlPr>
-                      </m:sSupPr>
-                      <m:e>
-                        <m:r>
-                          <a:rPr lang="en-US" b="0" i="1" smtClean="0">
-                            <a:latin typeface="Cambria Math" panose="02040503050406030204" pitchFamily="18" charset="0"/>
-                          </a:rPr>
-                          <m:t>𝐿</m:t>
-                        </m:r>
-                      </m:e>
-                      <m:sup>
-                        <m:r>
-                          <a:rPr lang="en-US" b="0" i="1" smtClean="0">
-                            <a:latin typeface="Cambria Math" panose="02040503050406030204" pitchFamily="18" charset="0"/>
-                          </a:rPr>
-                          <m:t>∗</m:t>
-                        </m:r>
-                      </m:sup>
-                    </m:sSup>
-                    <m:d>
-                      <m:dPr>
-                        <m:ctrlPr>
-                          <a:rPr lang="en-US" b="0" i="1" smtClean="0">
-                            <a:latin typeface="Cambria Math" panose="02040503050406030204" pitchFamily="18" charset="0"/>
-                          </a:rPr>
-                        </m:ctrlPr>
-                      </m:dPr>
-                      <m:e>
-                        <m:r>
-                          <a:rPr lang="en-US" b="0" i="1" smtClean="0">
-                            <a:latin typeface="Cambria Math" panose="02040503050406030204" pitchFamily="18" charset="0"/>
-                          </a:rPr>
-                          <m:t>𝜆</m:t>
-                        </m:r>
-                      </m:e>
-                    </m:d>
-                    <m:r>
-                      <a:rPr lang="en-US" b="0" i="1" smtClean="0">
-                        <a:latin typeface="Cambria Math" panose="02040503050406030204" pitchFamily="18" charset="0"/>
-                      </a:rPr>
-                      <m:t>=</m:t>
-                    </m:r>
-                    <m:func>
-                      <m:funcPr>
-                        <m:ctrlPr>
-                          <a:rPr lang="en-US" b="0" i="1" smtClean="0">
-                            <a:latin typeface="Cambria Math" panose="02040503050406030204" pitchFamily="18" charset="0"/>
-                          </a:rPr>
-                        </m:ctrlPr>
-                      </m:funcPr>
-                      <m:fName>
-                        <m:limLow>
-                          <m:limLowPr>
-                            <m:ctrlPr>
-                              <a:rPr lang="en-US" b="0" i="1" smtClean="0">
-                                <a:latin typeface="Cambria Math" panose="02040503050406030204" pitchFamily="18" charset="0"/>
-                              </a:rPr>
-                            </m:ctrlPr>
-                          </m:limLowPr>
-                          <m:e>
-                            <m:r>
-                              <m:rPr>
-                                <m:sty m:val="p"/>
-                              </m:rPr>
-                              <a:rPr lang="en-US" b="0" i="0" smtClean="0">
-                                <a:latin typeface="Cambria Math" panose="02040503050406030204" pitchFamily="18" charset="0"/>
-                              </a:rPr>
-                              <m:t>min</m:t>
-                            </m:r>
-                          </m:e>
-                          <m:lim>
-                            <m:r>
-                              <a:rPr lang="en-US" b="0" i="1" smtClean="0">
-                                <a:latin typeface="Cambria Math" panose="02040503050406030204" pitchFamily="18" charset="0"/>
-                              </a:rPr>
-                              <m:t>𝑤</m:t>
-                            </m:r>
-                          </m:lim>
-                        </m:limLow>
-                      </m:fName>
-                      <m:e>
-                        <m:r>
-                          <a:rPr lang="en-US" i="1">
-                            <a:latin typeface="Cambria Math" panose="02040503050406030204" pitchFamily="18" charset="0"/>
-                          </a:rPr>
-                          <m:t>𝐿</m:t>
-                        </m:r>
-                        <m:r>
-                          <a:rPr lang="en-US" i="1">
-                            <a:latin typeface="Cambria Math" panose="02040503050406030204" pitchFamily="18" charset="0"/>
-                          </a:rPr>
-                          <m:t>(</m:t>
-                        </m:r>
-                        <m:r>
-                          <a:rPr lang="en-US" b="1" i="1">
-                            <a:latin typeface="Cambria Math" panose="02040503050406030204" pitchFamily="18" charset="0"/>
-                          </a:rPr>
-                          <m:t>𝒘</m:t>
-                        </m:r>
-                        <m:r>
-                          <a:rPr lang="en-US" i="1">
-                            <a:latin typeface="Cambria Math" panose="02040503050406030204" pitchFamily="18" charset="0"/>
-                          </a:rPr>
-                          <m:t>,</m:t>
-                        </m:r>
-                        <m:r>
-                          <a:rPr lang="en-US" i="1">
-                            <a:latin typeface="Cambria Math" panose="02040503050406030204" pitchFamily="18" charset="0"/>
-                          </a:rPr>
-                          <m:t>𝜆</m:t>
-                        </m:r>
-                        <m:r>
-                          <a:rPr lang="en-US" i="1">
-                            <a:latin typeface="Cambria Math" panose="02040503050406030204" pitchFamily="18" charset="0"/>
-                          </a:rPr>
-                          <m:t>)</m:t>
-                        </m:r>
-                      </m:e>
-                    </m:func>
-                  </m:oMath>
-                </a14:m>
-                <a:endParaRPr lang="en-US" dirty="0"/>
-              </a:p>
-              <a:p>
-                <a:pPr lvl="1"/>
-                <a:endParaRPr lang="en-US" dirty="0"/>
-              </a:p>
-              <a:p>
-                <a:pPr lvl="1"/>
-                <a:r>
-                  <a:rPr lang="en-US" dirty="0"/>
-                  <a:t>Minimizes a weighted combination of objective and constraint.</a:t>
-                </a:r>
-              </a:p>
-              <a:p>
-                <a:pPr lvl="1"/>
-                <a:r>
-                  <a:rPr lang="en-US" dirty="0"/>
-                  <a:t>Higher </a:t>
-                </a:r>
-                <a14:m>
-                  <m:oMath xmlns:m="http://schemas.openxmlformats.org/officeDocument/2006/math">
-                    <m:r>
-                      <a:rPr lang="en-US" i="1">
-                        <a:latin typeface="Cambria Math" panose="02040503050406030204" pitchFamily="18" charset="0"/>
-                      </a:rPr>
-                      <m:t>𝜆</m:t>
-                    </m:r>
-                    <m:r>
-                      <a:rPr lang="en-US" b="0" i="1" smtClean="0">
-                        <a:latin typeface="Cambria Math" panose="02040503050406030204" pitchFamily="18" charset="0"/>
-                      </a:rPr>
-                      <m:t>⇒</m:t>
-                    </m:r>
-                  </m:oMath>
-                </a14:m>
-                <a:r>
-                  <a:rPr lang="en-US" dirty="0"/>
-                  <a:t>  Weight constraint more (try to make </a:t>
-                </a:r>
-                <a14:m>
-                  <m:oMath xmlns:m="http://schemas.openxmlformats.org/officeDocument/2006/math">
-                    <m:r>
-                      <a:rPr lang="en-US" i="1">
-                        <a:latin typeface="Cambria Math" panose="02040503050406030204" pitchFamily="18" charset="0"/>
-                      </a:rPr>
-                      <m:t>𝑔</m:t>
-                    </m:r>
-                    <m:d>
-                      <m:dPr>
-                        <m:ctrlPr>
-                          <a:rPr lang="en-US" i="1">
-                            <a:latin typeface="Cambria Math" panose="02040503050406030204" pitchFamily="18" charset="0"/>
-                          </a:rPr>
-                        </m:ctrlPr>
-                      </m:dPr>
-                      <m:e>
-                        <m:r>
-                          <a:rPr lang="en-US" b="1" i="1">
-                            <a:latin typeface="Cambria Math" panose="02040503050406030204" pitchFamily="18" charset="0"/>
-                          </a:rPr>
-                          <m:t>𝒘</m:t>
-                        </m:r>
-                      </m:e>
-                    </m:d>
-                  </m:oMath>
-                </a14:m>
-                <a:r>
-                  <a:rPr lang="en-US" dirty="0"/>
-                  <a:t> smaller)</a:t>
-                </a:r>
-              </a:p>
-              <a:p>
-                <a:pPr lvl="1"/>
-                <a:r>
-                  <a:rPr lang="en-US" dirty="0"/>
-                  <a:t>Lower </a:t>
-                </a:r>
-                <a14:m>
-                  <m:oMath xmlns:m="http://schemas.openxmlformats.org/officeDocument/2006/math">
-                    <m:r>
-                      <a:rPr lang="en-US" i="1">
-                        <a:latin typeface="Cambria Math" panose="02040503050406030204" pitchFamily="18" charset="0"/>
-                      </a:rPr>
-                      <m:t>𝜆</m:t>
-                    </m:r>
-                    <m:r>
-                      <a:rPr lang="en-US" i="1">
-                        <a:latin typeface="Cambria Math" panose="02040503050406030204" pitchFamily="18" charset="0"/>
-                      </a:rPr>
-                      <m:t>⇒</m:t>
-                    </m:r>
-                  </m:oMath>
-                </a14:m>
-                <a:r>
-                  <a:rPr lang="en-US" dirty="0"/>
-                  <a:t>  Weight objective more (try to make </a:t>
-                </a:r>
-                <a14:m>
-                  <m:oMath xmlns:m="http://schemas.openxmlformats.org/officeDocument/2006/math">
-                    <m:r>
-                      <a:rPr lang="en-US" b="0" i="1" smtClean="0">
-                        <a:latin typeface="Cambria Math" panose="02040503050406030204" pitchFamily="18" charset="0"/>
-                      </a:rPr>
-                      <m:t>𝑓</m:t>
-                    </m:r>
-                    <m:d>
-                      <m:dPr>
-                        <m:ctrlPr>
-                          <a:rPr lang="en-US" i="1">
-                            <a:latin typeface="Cambria Math" panose="02040503050406030204" pitchFamily="18" charset="0"/>
-                          </a:rPr>
-                        </m:ctrlPr>
-                      </m:dPr>
-                      <m:e>
-                        <m:r>
-                          <a:rPr lang="en-US" b="1" i="1">
-                            <a:latin typeface="Cambria Math" panose="02040503050406030204" pitchFamily="18" charset="0"/>
-                          </a:rPr>
-                          <m:t>𝒘</m:t>
-                        </m:r>
-                      </m:e>
-                    </m:d>
-                  </m:oMath>
-                </a14:m>
-                <a:r>
-                  <a:rPr lang="en-US" dirty="0"/>
-                  <a:t> smaller)</a:t>
-                </a:r>
-              </a:p>
-              <a:p>
-                <a:pPr lvl="1"/>
-                <a:endParaRPr lang="en-US" dirty="0"/>
-              </a:p>
-              <a:p>
-                <a:pPr lvl="1"/>
-                <a:endParaRPr lang="en-US" dirty="0"/>
-              </a:p>
-            </p:txBody>
-          </p:sp>
-        </mc:Choice>
-        <mc:Fallback xmlns="">
-          <p:sp>
-            <p:nvSpPr>
-              <p:cNvPr id="3" name="Content Placeholder 2"/>
-              <p:cNvSpPr>
-                <a:spLocks noGrp="1" noRot="1" noChangeAspect="1" noMove="1" noResize="1" noEditPoints="1" noAdjustHandles="1" noChangeArrowheads="1" noChangeShapeType="1" noTextEdit="1"/>
-              </p:cNvSpPr>
-              <p:nvPr>
-                <p:ph idx="1"/>
-              </p:nvPr>
-            </p:nvSpPr>
-            <p:spPr>
-              <a:blipFill>
-                <a:blip r:embed="rId2"/>
-                <a:stretch>
-                  <a:fillRect l="-1261" t="-1462" b="-877"/>
-                </a:stretch>
-              </a:blipFill>
-            </p:spPr>
-            <p:txBody>
-              <a:bodyPr/>
-              <a:lstStyle/>
-              <a:p>
-                <a:r>
-                  <a:rPr lang="en-US">
-                    <a:noFill/>
-                  </a:rPr>
-                  <a:t> </a:t>
-                </a:r>
-              </a:p>
-            </p:txBody>
-          </p:sp>
-        </mc:Fallback>
-      </mc:AlternateContent>
-      <p:sp>
-        <p:nvSpPr>
-          <p:cNvPr id="4" name="Slide Number Placeholder 3"/>
-          <p:cNvSpPr>
-            <a:spLocks noGrp="1"/>
-          </p:cNvSpPr>
-          <p:nvPr>
-            <p:ph type="sldNum" sz="quarter" idx="12"/>
-          </p:nvPr>
-        </p:nvSpPr>
-        <p:spPr/>
-        <p:txBody>
-          <a:bodyPr/>
-          <a:lstStyle/>
-          <a:p>
-            <a:fld id="{629637A9-119A-49DA-BD12-AAC58B377D80}" type="slidenum">
-              <a:rPr lang="en-US" smtClean="0"/>
-              <a:t>49</a:t>
-            </a:fld>
-            <a:endParaRPr lang="en-US" dirty="0"/>
-          </a:p>
-        </p:txBody>
-      </p:sp>
-    </p:spTree>
-    <p:extLst>
-      <p:ext uri="{BB962C8B-B14F-4D97-AF65-F5344CB8AC3E}">
-        <p14:creationId xmlns:p14="http://schemas.microsoft.com/office/powerpoint/2010/main" val="1637689429"/>
       </p:ext>
     </p:extLst>
   </p:cSld>
@@ -36406,6 +36167,929 @@
           <a:lstStyle/>
           <a:p>
             <a:r>
+              <a:rPr lang="en-US" dirty="0" err="1"/>
+              <a:t>Lagrangian</a:t>
+            </a:r>
+            <a:endParaRPr lang="en-US" dirty="0"/>
+          </a:p>
+        </p:txBody>
+      </p:sp>
+      <mc:AlternateContent xmlns:mc="http://schemas.openxmlformats.org/markup-compatibility/2006" xmlns:a14="http://schemas.microsoft.com/office/drawing/2010/main">
+        <mc:Choice Requires="a14">
+          <p:sp>
+            <p:nvSpPr>
+              <p:cNvPr id="3" name="Content Placeholder 2"/>
+              <p:cNvSpPr>
+                <a:spLocks noGrp="1"/>
+              </p:cNvSpPr>
+              <p:nvPr>
+                <p:ph idx="1"/>
+              </p:nvPr>
+            </p:nvSpPr>
+            <p:spPr/>
+            <p:txBody>
+              <a:bodyPr/>
+              <a:lstStyle/>
+              <a:p>
+                <a:r>
+                  <a:rPr lang="en-US" dirty="0"/>
+                  <a:t>Constrained optimization: Min </a:t>
+                </a:r>
+                <a14:m>
+                  <m:oMath xmlns:m="http://schemas.openxmlformats.org/officeDocument/2006/math">
+                    <m:r>
+                      <a:rPr lang="en-US" i="1">
+                        <a:latin typeface="Cambria Math" panose="02040503050406030204" pitchFamily="18" charset="0"/>
+                      </a:rPr>
+                      <m:t>𝑓</m:t>
+                    </m:r>
+                    <m:d>
+                      <m:dPr>
+                        <m:ctrlPr>
+                          <a:rPr lang="en-US" i="1">
+                            <a:latin typeface="Cambria Math" panose="02040503050406030204" pitchFamily="18" charset="0"/>
+                          </a:rPr>
+                        </m:ctrlPr>
+                      </m:dPr>
+                      <m:e>
+                        <m:r>
+                          <a:rPr lang="en-US" b="1" i="1">
+                            <a:latin typeface="Cambria Math" panose="02040503050406030204" pitchFamily="18" charset="0"/>
+                          </a:rPr>
+                          <m:t>𝒘</m:t>
+                        </m:r>
+                      </m:e>
+                    </m:d>
+                    <m:r>
+                      <a:rPr lang="en-US" b="1" i="1">
+                        <a:latin typeface="Cambria Math" panose="02040503050406030204" pitchFamily="18" charset="0"/>
+                      </a:rPr>
+                      <m:t> </m:t>
+                    </m:r>
+                    <m:r>
+                      <m:rPr>
+                        <m:nor/>
+                      </m:rPr>
+                      <a:rPr lang="en-US" b="1" i="0">
+                        <a:latin typeface="Cambria Math" panose="02040503050406030204" pitchFamily="18" charset="0"/>
+                      </a:rPr>
+                      <m:t> </m:t>
+                    </m:r>
+                    <m:r>
+                      <m:rPr>
+                        <m:nor/>
+                      </m:rPr>
+                      <a:rPr lang="en-US" i="0">
+                        <a:latin typeface="Cambria Math" panose="02040503050406030204" pitchFamily="18" charset="0"/>
+                      </a:rPr>
+                      <m:t>s</m:t>
+                    </m:r>
+                    <m:r>
+                      <m:rPr>
+                        <m:nor/>
+                      </m:rPr>
+                      <a:rPr lang="en-US" i="0">
+                        <a:latin typeface="Cambria Math" panose="02040503050406030204" pitchFamily="18" charset="0"/>
+                      </a:rPr>
+                      <m:t>.</m:t>
+                    </m:r>
+                    <m:r>
+                      <m:rPr>
+                        <m:nor/>
+                      </m:rPr>
+                      <a:rPr lang="en-US" i="0">
+                        <a:latin typeface="Cambria Math" panose="02040503050406030204" pitchFamily="18" charset="0"/>
+                      </a:rPr>
+                      <m:t>t</m:t>
+                    </m:r>
+                    <m:r>
+                      <m:rPr>
+                        <m:nor/>
+                      </m:rPr>
+                      <a:rPr lang="en-US" i="0">
+                        <a:latin typeface="Cambria Math" panose="02040503050406030204" pitchFamily="18" charset="0"/>
+                      </a:rPr>
+                      <m:t>.</m:t>
+                    </m:r>
+                    <m:r>
+                      <a:rPr lang="en-US" i="1">
+                        <a:latin typeface="Cambria Math" panose="02040503050406030204" pitchFamily="18" charset="0"/>
+                      </a:rPr>
+                      <m:t>  </m:t>
+                    </m:r>
+                    <m:r>
+                      <a:rPr lang="en-US" i="1">
+                        <a:latin typeface="Cambria Math" panose="02040503050406030204" pitchFamily="18" charset="0"/>
+                      </a:rPr>
+                      <m:t>𝑔</m:t>
+                    </m:r>
+                    <m:d>
+                      <m:dPr>
+                        <m:ctrlPr>
+                          <a:rPr lang="en-US" i="1">
+                            <a:latin typeface="Cambria Math" panose="02040503050406030204" pitchFamily="18" charset="0"/>
+                          </a:rPr>
+                        </m:ctrlPr>
+                      </m:dPr>
+                      <m:e>
+                        <m:r>
+                          <a:rPr lang="en-US" b="1" i="1">
+                            <a:latin typeface="Cambria Math" panose="02040503050406030204" pitchFamily="18" charset="0"/>
+                          </a:rPr>
+                          <m:t>𝒘</m:t>
+                        </m:r>
+                      </m:e>
+                    </m:d>
+                    <m:r>
+                      <a:rPr lang="en-US" i="1">
+                        <a:latin typeface="Cambria Math" panose="02040503050406030204" pitchFamily="18" charset="0"/>
+                      </a:rPr>
+                      <m:t>≤0</m:t>
+                    </m:r>
+                  </m:oMath>
+                </a14:m>
+                <a:endParaRPr lang="en-US" dirty="0"/>
+              </a:p>
+              <a:p>
+                <a:r>
+                  <a:rPr lang="en-US" dirty="0"/>
+                  <a:t>Consider first a single constraint:  </a:t>
+                </a:r>
+                <a14:m>
+                  <m:oMath xmlns:m="http://schemas.openxmlformats.org/officeDocument/2006/math">
+                    <m:r>
+                      <a:rPr lang="en-US" i="1">
+                        <a:latin typeface="Cambria Math" panose="02040503050406030204" pitchFamily="18" charset="0"/>
+                      </a:rPr>
+                      <m:t>𝑔</m:t>
+                    </m:r>
+                    <m:d>
+                      <m:dPr>
+                        <m:ctrlPr>
+                          <a:rPr lang="en-US" i="1">
+                            <a:latin typeface="Cambria Math" panose="02040503050406030204" pitchFamily="18" charset="0"/>
+                          </a:rPr>
+                        </m:ctrlPr>
+                      </m:dPr>
+                      <m:e>
+                        <m:r>
+                          <a:rPr lang="en-US" b="1" i="1">
+                            <a:latin typeface="Cambria Math" panose="02040503050406030204" pitchFamily="18" charset="0"/>
+                          </a:rPr>
+                          <m:t>𝒘</m:t>
+                        </m:r>
+                      </m:e>
+                    </m:d>
+                  </m:oMath>
+                </a14:m>
+                <a:r>
+                  <a:rPr lang="en-US" dirty="0"/>
+                  <a:t> is a scalar </a:t>
+                </a:r>
+              </a:p>
+              <a:p>
+                <a:r>
+                  <a:rPr lang="en-US" dirty="0"/>
+                  <a:t>Define </a:t>
+                </a:r>
+                <a:r>
+                  <a:rPr lang="en-US" dirty="0" err="1">
+                    <a:solidFill>
+                      <a:schemeClr val="accent1">
+                        <a:lumMod val="60000"/>
+                        <a:lumOff val="40000"/>
+                      </a:schemeClr>
+                    </a:solidFill>
+                  </a:rPr>
+                  <a:t>Lagrangian</a:t>
+                </a:r>
+                <a:r>
+                  <a:rPr lang="en-US" dirty="0"/>
+                  <a:t>:   </a:t>
+                </a:r>
+                <a14:m>
+                  <m:oMath xmlns:m="http://schemas.openxmlformats.org/officeDocument/2006/math">
+                    <m:r>
+                      <a:rPr lang="en-US" b="0" i="1" smtClean="0">
+                        <a:latin typeface="Cambria Math" panose="02040503050406030204" pitchFamily="18" charset="0"/>
+                      </a:rPr>
+                      <m:t>𝐿</m:t>
+                    </m:r>
+                    <m:d>
+                      <m:dPr>
+                        <m:ctrlPr>
+                          <a:rPr lang="en-US" b="0" i="1" smtClean="0">
+                            <a:latin typeface="Cambria Math" panose="02040503050406030204" pitchFamily="18" charset="0"/>
+                          </a:rPr>
+                        </m:ctrlPr>
+                      </m:dPr>
+                      <m:e>
+                        <m:r>
+                          <a:rPr lang="en-US" b="1" i="1" smtClean="0">
+                            <a:latin typeface="Cambria Math" panose="02040503050406030204" pitchFamily="18" charset="0"/>
+                          </a:rPr>
+                          <m:t>𝒘</m:t>
+                        </m:r>
+                        <m:r>
+                          <a:rPr lang="en-US" b="0" i="1" smtClean="0">
+                            <a:latin typeface="Cambria Math" panose="02040503050406030204" pitchFamily="18" charset="0"/>
+                          </a:rPr>
+                          <m:t>,</m:t>
+                        </m:r>
+                        <m:r>
+                          <a:rPr lang="en-US" b="0" i="1" smtClean="0">
+                            <a:latin typeface="Cambria Math" panose="02040503050406030204" pitchFamily="18" charset="0"/>
+                          </a:rPr>
+                          <m:t>𝜆</m:t>
+                        </m:r>
+                      </m:e>
+                    </m:d>
+                    <m:r>
+                      <a:rPr lang="en-US" b="0" i="1" smtClean="0">
+                        <a:latin typeface="Cambria Math" panose="02040503050406030204" pitchFamily="18" charset="0"/>
+                      </a:rPr>
+                      <m:t>=</m:t>
+                    </m:r>
+                    <m:r>
+                      <a:rPr lang="en-US" b="0" i="1" smtClean="0">
+                        <a:latin typeface="Cambria Math" panose="02040503050406030204" pitchFamily="18" charset="0"/>
+                      </a:rPr>
+                      <m:t>𝑓</m:t>
+                    </m:r>
+                    <m:d>
+                      <m:dPr>
+                        <m:ctrlPr>
+                          <a:rPr lang="en-US" b="0" i="1" smtClean="0">
+                            <a:latin typeface="Cambria Math" panose="02040503050406030204" pitchFamily="18" charset="0"/>
+                          </a:rPr>
+                        </m:ctrlPr>
+                      </m:dPr>
+                      <m:e>
+                        <m:r>
+                          <a:rPr lang="en-US" b="1" i="1" smtClean="0">
+                            <a:latin typeface="Cambria Math" panose="02040503050406030204" pitchFamily="18" charset="0"/>
+                          </a:rPr>
+                          <m:t>𝒘</m:t>
+                        </m:r>
+                      </m:e>
+                    </m:d>
+                    <m:r>
+                      <a:rPr lang="en-US" b="0" i="1" smtClean="0">
+                        <a:latin typeface="Cambria Math" panose="02040503050406030204" pitchFamily="18" charset="0"/>
+                      </a:rPr>
+                      <m:t>+</m:t>
+                    </m:r>
+                    <m:r>
+                      <a:rPr lang="en-US" b="0" i="1" smtClean="0">
+                        <a:latin typeface="Cambria Math" panose="02040503050406030204" pitchFamily="18" charset="0"/>
+                      </a:rPr>
+                      <m:t>𝜆</m:t>
+                    </m:r>
+                    <m:r>
+                      <a:rPr lang="en-US" b="0" i="1" smtClean="0">
+                        <a:latin typeface="Cambria Math" panose="02040503050406030204" pitchFamily="18" charset="0"/>
+                      </a:rPr>
+                      <m:t>𝑔</m:t>
+                    </m:r>
+                    <m:d>
+                      <m:dPr>
+                        <m:ctrlPr>
+                          <a:rPr lang="en-US" b="0" i="1" smtClean="0">
+                            <a:latin typeface="Cambria Math" panose="02040503050406030204" pitchFamily="18" charset="0"/>
+                          </a:rPr>
+                        </m:ctrlPr>
+                      </m:dPr>
+                      <m:e>
+                        <m:r>
+                          <a:rPr lang="en-US" b="1" i="1" smtClean="0">
+                            <a:latin typeface="Cambria Math" panose="02040503050406030204" pitchFamily="18" charset="0"/>
+                          </a:rPr>
+                          <m:t>𝒘</m:t>
+                        </m:r>
+                      </m:e>
+                    </m:d>
+                  </m:oMath>
+                </a14:m>
+                <a:endParaRPr lang="en-US" b="0" dirty="0"/>
+              </a:p>
+              <a:p>
+                <a:pPr lvl="1"/>
+                <a14:m>
+                  <m:oMath xmlns:m="http://schemas.openxmlformats.org/officeDocument/2006/math">
+                    <m:r>
+                      <a:rPr lang="en-US" b="1" i="1">
+                        <a:latin typeface="Cambria Math" panose="02040503050406030204" pitchFamily="18" charset="0"/>
+                      </a:rPr>
+                      <m:t>𝒘</m:t>
+                    </m:r>
+                  </m:oMath>
+                </a14:m>
+                <a:r>
+                  <a:rPr lang="en-US" dirty="0"/>
+                  <a:t> is called the </a:t>
+                </a:r>
+                <a:r>
+                  <a:rPr lang="en-US" dirty="0">
+                    <a:solidFill>
+                      <a:schemeClr val="accent1">
+                        <a:lumMod val="60000"/>
+                        <a:lumOff val="40000"/>
+                      </a:schemeClr>
+                    </a:solidFill>
+                  </a:rPr>
+                  <a:t>primal</a:t>
+                </a:r>
+                <a:r>
+                  <a:rPr lang="en-US" dirty="0"/>
+                  <a:t> variable</a:t>
+                </a:r>
+              </a:p>
+              <a:p>
+                <a:pPr lvl="1"/>
+                <a14:m>
+                  <m:oMath xmlns:m="http://schemas.openxmlformats.org/officeDocument/2006/math">
+                    <m:r>
+                      <a:rPr lang="en-US" b="0" i="1" smtClean="0">
+                        <a:latin typeface="Cambria Math" panose="02040503050406030204" pitchFamily="18" charset="0"/>
+                      </a:rPr>
+                      <m:t>𝜆</m:t>
+                    </m:r>
+                  </m:oMath>
+                </a14:m>
+                <a:r>
+                  <a:rPr lang="en-US" dirty="0"/>
+                  <a:t> is called the </a:t>
+                </a:r>
+                <a:r>
+                  <a:rPr lang="en-US" dirty="0">
+                    <a:solidFill>
+                      <a:schemeClr val="accent1">
+                        <a:lumMod val="60000"/>
+                        <a:lumOff val="40000"/>
+                      </a:schemeClr>
+                    </a:solidFill>
+                  </a:rPr>
+                  <a:t>dual</a:t>
+                </a:r>
+                <a:r>
+                  <a:rPr lang="en-US" dirty="0"/>
+                  <a:t> variable</a:t>
+                </a:r>
+              </a:p>
+              <a:p>
+                <a:r>
+                  <a:rPr lang="en-US" dirty="0">
+                    <a:solidFill>
+                      <a:schemeClr val="tx2">
+                        <a:lumMod val="60000"/>
+                        <a:lumOff val="40000"/>
+                      </a:schemeClr>
+                    </a:solidFill>
+                  </a:rPr>
+                  <a:t>Dual minimization</a:t>
+                </a:r>
+                <a:r>
+                  <a:rPr lang="en-US" dirty="0"/>
+                  <a:t>:  Given a dual parameter </a:t>
+                </a:r>
+                <a14:m>
+                  <m:oMath xmlns:m="http://schemas.openxmlformats.org/officeDocument/2006/math">
+                    <m:r>
+                      <a:rPr lang="en-US" i="1">
+                        <a:latin typeface="Cambria Math" panose="02040503050406030204" pitchFamily="18" charset="0"/>
+                      </a:rPr>
+                      <m:t>𝜆</m:t>
+                    </m:r>
+                  </m:oMath>
+                </a14:m>
+                <a:r>
+                  <a:rPr lang="en-US" dirty="0"/>
+                  <a:t>, minimize</a:t>
+                </a:r>
+                <a:br>
+                  <a:rPr lang="en-US" dirty="0"/>
+                </a:br>
+                <a:br>
+                  <a:rPr lang="en-US" dirty="0"/>
+                </a:br>
+                <a14:m>
+                  <m:oMath xmlns:m="http://schemas.openxmlformats.org/officeDocument/2006/math">
+                    <m:acc>
+                      <m:accPr>
+                        <m:chr m:val="̂"/>
+                        <m:ctrlPr>
+                          <a:rPr lang="en-US" i="1" smtClean="0">
+                            <a:latin typeface="Cambria Math" panose="02040503050406030204" pitchFamily="18" charset="0"/>
+                          </a:rPr>
+                        </m:ctrlPr>
+                      </m:accPr>
+                      <m:e>
+                        <m:r>
+                          <a:rPr lang="en-US" b="1" i="1" smtClean="0">
+                            <a:latin typeface="Cambria Math" panose="02040503050406030204" pitchFamily="18" charset="0"/>
+                          </a:rPr>
+                          <m:t>𝒘</m:t>
+                        </m:r>
+                      </m:e>
+                    </m:acc>
+                    <m:d>
+                      <m:dPr>
+                        <m:ctrlPr>
+                          <a:rPr lang="en-US" b="0" i="1" smtClean="0">
+                            <a:latin typeface="Cambria Math" panose="02040503050406030204" pitchFamily="18" charset="0"/>
+                          </a:rPr>
+                        </m:ctrlPr>
+                      </m:dPr>
+                      <m:e>
+                        <m:r>
+                          <a:rPr lang="en-US" b="0" i="1" smtClean="0">
+                            <a:latin typeface="Cambria Math" panose="02040503050406030204" pitchFamily="18" charset="0"/>
+                          </a:rPr>
+                          <m:t>𝜆</m:t>
+                        </m:r>
+                      </m:e>
+                    </m:d>
+                    <m:r>
+                      <a:rPr lang="en-US" b="0" i="1" smtClean="0">
+                        <a:latin typeface="Cambria Math" panose="02040503050406030204" pitchFamily="18" charset="0"/>
+                      </a:rPr>
+                      <m:t>=</m:t>
+                    </m:r>
+                    <m:func>
+                      <m:funcPr>
+                        <m:ctrlPr>
+                          <a:rPr lang="en-US" b="0" i="1" smtClean="0">
+                            <a:latin typeface="Cambria Math" panose="02040503050406030204" pitchFamily="18" charset="0"/>
+                          </a:rPr>
+                        </m:ctrlPr>
+                      </m:funcPr>
+                      <m:fName>
+                        <m:r>
+                          <m:rPr>
+                            <m:sty m:val="p"/>
+                          </m:rPr>
+                          <a:rPr lang="en-US" b="0" i="0" smtClean="0">
+                            <a:latin typeface="Cambria Math" panose="02040503050406030204" pitchFamily="18" charset="0"/>
+                          </a:rPr>
+                          <m:t>arg</m:t>
+                        </m:r>
+                      </m:fName>
+                      <m:e>
+                        <m:func>
+                          <m:funcPr>
+                            <m:ctrlPr>
+                              <a:rPr lang="en-US" b="0" i="1" smtClean="0">
+                                <a:latin typeface="Cambria Math" panose="02040503050406030204" pitchFamily="18" charset="0"/>
+                              </a:rPr>
+                            </m:ctrlPr>
+                          </m:funcPr>
+                          <m:fName>
+                            <m:limLow>
+                              <m:limLowPr>
+                                <m:ctrlPr>
+                                  <a:rPr lang="en-US" b="0" i="1" smtClean="0">
+                                    <a:latin typeface="Cambria Math" panose="02040503050406030204" pitchFamily="18" charset="0"/>
+                                  </a:rPr>
+                                </m:ctrlPr>
+                              </m:limLowPr>
+                              <m:e>
+                                <m:r>
+                                  <m:rPr>
+                                    <m:sty m:val="p"/>
+                                  </m:rPr>
+                                  <a:rPr lang="en-US" b="0" i="0" smtClean="0">
+                                    <a:latin typeface="Cambria Math" panose="02040503050406030204" pitchFamily="18" charset="0"/>
+                                  </a:rPr>
+                                  <m:t>min</m:t>
+                                </m:r>
+                              </m:e>
+                              <m:lim>
+                                <m:r>
+                                  <a:rPr lang="en-US" b="1" i="1" smtClean="0">
+                                    <a:latin typeface="Cambria Math" panose="02040503050406030204" pitchFamily="18" charset="0"/>
+                                  </a:rPr>
+                                  <m:t>𝒘</m:t>
+                                </m:r>
+                              </m:lim>
+                            </m:limLow>
+                          </m:fName>
+                          <m:e>
+                            <m:r>
+                              <a:rPr lang="en-US" b="0" i="1" smtClean="0">
+                                <a:latin typeface="Cambria Math" panose="02040503050406030204" pitchFamily="18" charset="0"/>
+                              </a:rPr>
+                              <m:t>𝐿</m:t>
+                            </m:r>
+                            <m:r>
+                              <a:rPr lang="en-US" b="0" i="1" smtClean="0">
+                                <a:latin typeface="Cambria Math" panose="02040503050406030204" pitchFamily="18" charset="0"/>
+                              </a:rPr>
+                              <m:t>(</m:t>
+                            </m:r>
+                            <m:r>
+                              <a:rPr lang="en-US" b="1" i="1" smtClean="0">
+                                <a:latin typeface="Cambria Math" panose="02040503050406030204" pitchFamily="18" charset="0"/>
+                              </a:rPr>
+                              <m:t>𝒘</m:t>
+                            </m:r>
+                            <m:r>
+                              <a:rPr lang="en-US" b="0" i="1" smtClean="0">
+                                <a:latin typeface="Cambria Math" panose="02040503050406030204" pitchFamily="18" charset="0"/>
+                              </a:rPr>
+                              <m:t>,</m:t>
+                            </m:r>
+                            <m:r>
+                              <a:rPr lang="en-US" b="0" i="1" smtClean="0">
+                                <a:latin typeface="Cambria Math" panose="02040503050406030204" pitchFamily="18" charset="0"/>
+                              </a:rPr>
+                              <m:t>𝜆</m:t>
+                            </m:r>
+                            <m:r>
+                              <a:rPr lang="en-US" b="0" i="1" smtClean="0">
+                                <a:latin typeface="Cambria Math" panose="02040503050406030204" pitchFamily="18" charset="0"/>
+                              </a:rPr>
+                              <m:t>)</m:t>
+                            </m:r>
+                          </m:e>
+                        </m:func>
+                      </m:e>
+                    </m:func>
+                    <m:r>
+                      <a:rPr lang="en-US" b="0" i="1" smtClean="0">
+                        <a:latin typeface="Cambria Math" panose="02040503050406030204" pitchFamily="18" charset="0"/>
+                      </a:rPr>
+                      <m:t>,   </m:t>
+                    </m:r>
+                    <m:sSup>
+                      <m:sSupPr>
+                        <m:ctrlPr>
+                          <a:rPr lang="en-US" b="0" i="1" smtClean="0">
+                            <a:latin typeface="Cambria Math" panose="02040503050406030204" pitchFamily="18" charset="0"/>
+                          </a:rPr>
+                        </m:ctrlPr>
+                      </m:sSupPr>
+                      <m:e>
+                        <m:r>
+                          <a:rPr lang="en-US" b="0" i="1" smtClean="0">
+                            <a:latin typeface="Cambria Math" panose="02040503050406030204" pitchFamily="18" charset="0"/>
+                          </a:rPr>
+                          <m:t>𝐿</m:t>
+                        </m:r>
+                      </m:e>
+                      <m:sup>
+                        <m:r>
+                          <a:rPr lang="en-US" b="0" i="1" smtClean="0">
+                            <a:latin typeface="Cambria Math" panose="02040503050406030204" pitchFamily="18" charset="0"/>
+                          </a:rPr>
+                          <m:t>∗</m:t>
+                        </m:r>
+                      </m:sup>
+                    </m:sSup>
+                    <m:d>
+                      <m:dPr>
+                        <m:ctrlPr>
+                          <a:rPr lang="en-US" b="0" i="1" smtClean="0">
+                            <a:latin typeface="Cambria Math" panose="02040503050406030204" pitchFamily="18" charset="0"/>
+                          </a:rPr>
+                        </m:ctrlPr>
+                      </m:dPr>
+                      <m:e>
+                        <m:r>
+                          <a:rPr lang="en-US" b="0" i="1" smtClean="0">
+                            <a:latin typeface="Cambria Math" panose="02040503050406030204" pitchFamily="18" charset="0"/>
+                          </a:rPr>
+                          <m:t>𝜆</m:t>
+                        </m:r>
+                      </m:e>
+                    </m:d>
+                    <m:r>
+                      <a:rPr lang="en-US" b="0" i="1" smtClean="0">
+                        <a:latin typeface="Cambria Math" panose="02040503050406030204" pitchFamily="18" charset="0"/>
+                      </a:rPr>
+                      <m:t>=</m:t>
+                    </m:r>
+                    <m:func>
+                      <m:funcPr>
+                        <m:ctrlPr>
+                          <a:rPr lang="en-US" b="0" i="1" smtClean="0">
+                            <a:latin typeface="Cambria Math" panose="02040503050406030204" pitchFamily="18" charset="0"/>
+                          </a:rPr>
+                        </m:ctrlPr>
+                      </m:funcPr>
+                      <m:fName>
+                        <m:limLow>
+                          <m:limLowPr>
+                            <m:ctrlPr>
+                              <a:rPr lang="en-US" b="0" i="1" smtClean="0">
+                                <a:latin typeface="Cambria Math" panose="02040503050406030204" pitchFamily="18" charset="0"/>
+                              </a:rPr>
+                            </m:ctrlPr>
+                          </m:limLowPr>
+                          <m:e>
+                            <m:r>
+                              <m:rPr>
+                                <m:sty m:val="p"/>
+                              </m:rPr>
+                              <a:rPr lang="en-US" b="0" i="0" smtClean="0">
+                                <a:latin typeface="Cambria Math" panose="02040503050406030204" pitchFamily="18" charset="0"/>
+                              </a:rPr>
+                              <m:t>min</m:t>
+                            </m:r>
+                          </m:e>
+                          <m:lim>
+                            <m:r>
+                              <a:rPr lang="en-US" b="0" i="1" smtClean="0">
+                                <a:latin typeface="Cambria Math" panose="02040503050406030204" pitchFamily="18" charset="0"/>
+                              </a:rPr>
+                              <m:t>𝑤</m:t>
+                            </m:r>
+                          </m:lim>
+                        </m:limLow>
+                      </m:fName>
+                      <m:e>
+                        <m:r>
+                          <a:rPr lang="en-US" i="1">
+                            <a:latin typeface="Cambria Math" panose="02040503050406030204" pitchFamily="18" charset="0"/>
+                          </a:rPr>
+                          <m:t>𝐿</m:t>
+                        </m:r>
+                        <m:r>
+                          <a:rPr lang="en-US" i="1">
+                            <a:latin typeface="Cambria Math" panose="02040503050406030204" pitchFamily="18" charset="0"/>
+                          </a:rPr>
+                          <m:t>(</m:t>
+                        </m:r>
+                        <m:r>
+                          <a:rPr lang="en-US" b="1" i="1">
+                            <a:latin typeface="Cambria Math" panose="02040503050406030204" pitchFamily="18" charset="0"/>
+                          </a:rPr>
+                          <m:t>𝒘</m:t>
+                        </m:r>
+                        <m:r>
+                          <a:rPr lang="en-US" i="1">
+                            <a:latin typeface="Cambria Math" panose="02040503050406030204" pitchFamily="18" charset="0"/>
+                          </a:rPr>
+                          <m:t>,</m:t>
+                        </m:r>
+                        <m:r>
+                          <a:rPr lang="en-US" i="1">
+                            <a:latin typeface="Cambria Math" panose="02040503050406030204" pitchFamily="18" charset="0"/>
+                          </a:rPr>
+                          <m:t>𝜆</m:t>
+                        </m:r>
+                        <m:r>
+                          <a:rPr lang="en-US" i="1">
+                            <a:latin typeface="Cambria Math" panose="02040503050406030204" pitchFamily="18" charset="0"/>
+                          </a:rPr>
+                          <m:t>)</m:t>
+                        </m:r>
+                      </m:e>
+                    </m:func>
+                  </m:oMath>
+                </a14:m>
+                <a:endParaRPr lang="en-US" dirty="0"/>
+              </a:p>
+              <a:p>
+                <a:pPr lvl="1"/>
+                <a:endParaRPr lang="en-US" dirty="0"/>
+              </a:p>
+              <a:p>
+                <a:pPr lvl="1"/>
+                <a:r>
+                  <a:rPr lang="en-US" dirty="0"/>
+                  <a:t>Minimizes a weighted combination of objective and constraint.</a:t>
+                </a:r>
+              </a:p>
+              <a:p>
+                <a:pPr lvl="1"/>
+                <a:r>
+                  <a:rPr lang="en-US" dirty="0"/>
+                  <a:t>Higher </a:t>
+                </a:r>
+                <a14:m>
+                  <m:oMath xmlns:m="http://schemas.openxmlformats.org/officeDocument/2006/math">
+                    <m:r>
+                      <a:rPr lang="en-US" i="1">
+                        <a:latin typeface="Cambria Math" panose="02040503050406030204" pitchFamily="18" charset="0"/>
+                      </a:rPr>
+                      <m:t>𝜆</m:t>
+                    </m:r>
+                    <m:r>
+                      <a:rPr lang="en-US" b="0" i="1" smtClean="0">
+                        <a:latin typeface="Cambria Math" panose="02040503050406030204" pitchFamily="18" charset="0"/>
+                      </a:rPr>
+                      <m:t>⇒</m:t>
+                    </m:r>
+                  </m:oMath>
+                </a14:m>
+                <a:r>
+                  <a:rPr lang="en-US" dirty="0"/>
+                  <a:t>  Weight constraint more (try to make </a:t>
+                </a:r>
+                <a14:m>
+                  <m:oMath xmlns:m="http://schemas.openxmlformats.org/officeDocument/2006/math">
+                    <m:r>
+                      <a:rPr lang="en-US" i="1">
+                        <a:latin typeface="Cambria Math" panose="02040503050406030204" pitchFamily="18" charset="0"/>
+                      </a:rPr>
+                      <m:t>𝑔</m:t>
+                    </m:r>
+                    <m:d>
+                      <m:dPr>
+                        <m:ctrlPr>
+                          <a:rPr lang="en-US" i="1">
+                            <a:latin typeface="Cambria Math" panose="02040503050406030204" pitchFamily="18" charset="0"/>
+                          </a:rPr>
+                        </m:ctrlPr>
+                      </m:dPr>
+                      <m:e>
+                        <m:r>
+                          <a:rPr lang="en-US" b="1" i="1">
+                            <a:latin typeface="Cambria Math" panose="02040503050406030204" pitchFamily="18" charset="0"/>
+                          </a:rPr>
+                          <m:t>𝒘</m:t>
+                        </m:r>
+                      </m:e>
+                    </m:d>
+                  </m:oMath>
+                </a14:m>
+                <a:r>
+                  <a:rPr lang="en-US" dirty="0"/>
+                  <a:t> smaller)</a:t>
+                </a:r>
+              </a:p>
+              <a:p>
+                <a:pPr lvl="1"/>
+                <a:r>
+                  <a:rPr lang="en-US" dirty="0"/>
+                  <a:t>Lower </a:t>
+                </a:r>
+                <a14:m>
+                  <m:oMath xmlns:m="http://schemas.openxmlformats.org/officeDocument/2006/math">
+                    <m:r>
+                      <a:rPr lang="en-US" i="1">
+                        <a:latin typeface="Cambria Math" panose="02040503050406030204" pitchFamily="18" charset="0"/>
+                      </a:rPr>
+                      <m:t>𝜆</m:t>
+                    </m:r>
+                    <m:r>
+                      <a:rPr lang="en-US" i="1">
+                        <a:latin typeface="Cambria Math" panose="02040503050406030204" pitchFamily="18" charset="0"/>
+                      </a:rPr>
+                      <m:t>⇒</m:t>
+                    </m:r>
+                  </m:oMath>
+                </a14:m>
+                <a:r>
+                  <a:rPr lang="en-US" dirty="0"/>
+                  <a:t>  Weight objective more (try to make </a:t>
+                </a:r>
+                <a14:m>
+                  <m:oMath xmlns:m="http://schemas.openxmlformats.org/officeDocument/2006/math">
+                    <m:r>
+                      <a:rPr lang="en-US" b="0" i="1" smtClean="0">
+                        <a:latin typeface="Cambria Math" panose="02040503050406030204" pitchFamily="18" charset="0"/>
+                      </a:rPr>
+                      <m:t>𝑓</m:t>
+                    </m:r>
+                    <m:d>
+                      <m:dPr>
+                        <m:ctrlPr>
+                          <a:rPr lang="en-US" i="1">
+                            <a:latin typeface="Cambria Math" panose="02040503050406030204" pitchFamily="18" charset="0"/>
+                          </a:rPr>
+                        </m:ctrlPr>
+                      </m:dPr>
+                      <m:e>
+                        <m:r>
+                          <a:rPr lang="en-US" b="1" i="1">
+                            <a:latin typeface="Cambria Math" panose="02040503050406030204" pitchFamily="18" charset="0"/>
+                          </a:rPr>
+                          <m:t>𝒘</m:t>
+                        </m:r>
+                      </m:e>
+                    </m:d>
+                  </m:oMath>
+                </a14:m>
+                <a:r>
+                  <a:rPr lang="en-US" dirty="0"/>
+                  <a:t> smaller)</a:t>
+                </a:r>
+              </a:p>
+              <a:p>
+                <a:pPr lvl="1"/>
+                <a:endParaRPr lang="en-US" dirty="0"/>
+              </a:p>
+              <a:p>
+                <a:pPr lvl="1"/>
+                <a:endParaRPr lang="en-US" dirty="0"/>
+              </a:p>
+            </p:txBody>
+          </p:sp>
+        </mc:Choice>
+        <mc:Fallback xmlns="">
+          <p:sp>
+            <p:nvSpPr>
+              <p:cNvPr id="3" name="Content Placeholder 2"/>
+              <p:cNvSpPr>
+                <a:spLocks noGrp="1" noRot="1" noChangeAspect="1" noMove="1" noResize="1" noEditPoints="1" noAdjustHandles="1" noChangeArrowheads="1" noChangeShapeType="1" noTextEdit="1"/>
+              </p:cNvSpPr>
+              <p:nvPr>
+                <p:ph idx="1"/>
+              </p:nvPr>
+            </p:nvSpPr>
+            <p:spPr>
+              <a:blipFill>
+                <a:blip r:embed="rId2"/>
+                <a:stretch>
+                  <a:fillRect l="-1261" t="-1462" b="-877"/>
+                </a:stretch>
+              </a:blipFill>
+            </p:spPr>
+            <p:txBody>
+              <a:bodyPr/>
+              <a:lstStyle/>
+              <a:p>
+                <a:r>
+                  <a:rPr lang="en-US">
+                    <a:noFill/>
+                  </a:rPr>
+                  <a:t> </a:t>
+                </a:r>
+              </a:p>
+            </p:txBody>
+          </p:sp>
+        </mc:Fallback>
+      </mc:AlternateContent>
+      <p:sp>
+        <p:nvSpPr>
+          <p:cNvPr id="4" name="Slide Number Placeholder 3"/>
+          <p:cNvSpPr>
+            <a:spLocks noGrp="1"/>
+          </p:cNvSpPr>
+          <p:nvPr>
+            <p:ph type="sldNum" sz="quarter" idx="12"/>
+          </p:nvPr>
+        </p:nvSpPr>
+        <p:spPr/>
+        <p:txBody>
+          <a:bodyPr/>
+          <a:lstStyle/>
+          <a:p>
+            <a:fld id="{629637A9-119A-49DA-BD12-AAC58B377D80}" type="slidenum">
+              <a:rPr lang="en-US" smtClean="0"/>
+              <a:t>50</a:t>
+            </a:fld>
+            <a:endParaRPr lang="en-US" dirty="0"/>
+          </a:p>
+        </p:txBody>
+      </p:sp>
+    </p:spTree>
+    <p:extLst>
+      <p:ext uri="{BB962C8B-B14F-4D97-AF65-F5344CB8AC3E}">
+        <p14:creationId xmlns:p14="http://schemas.microsoft.com/office/powerpoint/2010/main" val="1637689429"/>
+      </p:ext>
+    </p:extLst>
+  </p:cSld>
+  <p:clrMapOvr>
+    <a:masterClrMapping/>
+  </p:clrMapOvr>
+</p:sld>
+</file>
+
+<file path=ppt/slides/slide51.xml><?xml version="1.0" encoding="utf-8"?>
+<p:sld xmlns:a="http://schemas.openxmlformats.org/drawingml/2006/main" xmlns:r="http://schemas.openxmlformats.org/officeDocument/2006/relationships" xmlns:p="http://schemas.openxmlformats.org/presentationml/2006/main">
+  <p:cSld>
+    <p:spTree>
+      <p:nvGrpSpPr>
+        <p:cNvPr id="1" name=""/>
+        <p:cNvGrpSpPr/>
+        <p:nvPr/>
+      </p:nvGrpSpPr>
+      <p:grpSpPr>
+        <a:xfrm>
+          <a:off x="0" y="0"/>
+          <a:ext cx="0" cy="0"/>
+          <a:chOff x="0" y="0"/>
+          <a:chExt cx="0" cy="0"/>
+        </a:xfrm>
+      </p:grpSpPr>
+      <p:sp>
+        <p:nvSpPr>
+          <p:cNvPr id="2" name="Title 1"/>
+          <p:cNvSpPr>
+            <a:spLocks noGrp="1"/>
+          </p:cNvSpPr>
+          <p:nvPr>
+            <p:ph type="title"/>
+          </p:nvPr>
+        </p:nvSpPr>
+        <p:spPr/>
+        <p:txBody>
+          <a:bodyPr/>
+          <a:lstStyle/>
+          <a:p>
+            <a:r>
               <a:rPr lang="en-US" dirty="0"/>
               <a:t>KKT Conditions</a:t>
             </a:r>
@@ -37074,7 +37758,7 @@
           <a:p>
             <a:fld id="{629637A9-119A-49DA-BD12-AAC58B377D80}" type="slidenum">
               <a:rPr lang="en-US" smtClean="0"/>
-              <a:t>50</a:t>
+              <a:t>51</a:t>
             </a:fld>
             <a:endParaRPr lang="en-US" dirty="0"/>
           </a:p>
@@ -37093,7 +37777,7 @@
 </p:sld>
 </file>
 
-<file path=ppt/slides/slide51.xml><?xml version="1.0" encoding="utf-8"?>
+<file path=ppt/slides/slide52.xml><?xml version="1.0" encoding="utf-8"?>
 <p:sld xmlns:a="http://schemas.openxmlformats.org/drawingml/2006/main" xmlns:r="http://schemas.openxmlformats.org/officeDocument/2006/relationships" xmlns:p="http://schemas.openxmlformats.org/presentationml/2006/main">
   <p:cSld>
     <p:spTree>
@@ -37888,7 +38572,7 @@
           <a:p>
             <a:fld id="{629637A9-119A-49DA-BD12-AAC58B377D80}" type="slidenum">
               <a:rPr lang="en-US" smtClean="0"/>
-              <a:t>51</a:t>
+              <a:t>52</a:t>
             </a:fld>
             <a:endParaRPr lang="en-US" dirty="0"/>
           </a:p>
@@ -37907,7 +38591,7 @@
 </p:sld>
 </file>
 
-<file path=ppt/slides/slide52.xml><?xml version="1.0" encoding="utf-8"?>
+<file path=ppt/slides/slide53.xml><?xml version="1.0" encoding="utf-8"?>
 <p:sld xmlns:a="http://schemas.openxmlformats.org/drawingml/2006/main" xmlns:r="http://schemas.openxmlformats.org/officeDocument/2006/relationships" xmlns:p="http://schemas.openxmlformats.org/presentationml/2006/main">
   <p:cSld>
     <p:spTree>
@@ -38281,7 +38965,7 @@
           <a:p>
             <a:fld id="{629637A9-119A-49DA-BD12-AAC58B377D80}" type="slidenum">
               <a:rPr lang="en-US" smtClean="0"/>
-              <a:t>52</a:t>
+              <a:t>53</a:t>
             </a:fld>
             <a:endParaRPr lang="en-US" dirty="0"/>
           </a:p>
@@ -38300,7 +38984,7 @@
 </p:sld>
 </file>
 
-<file path=ppt/slides/slide53.xml><?xml version="1.0" encoding="utf-8"?>
+<file path=ppt/slides/slide54.xml><?xml version="1.0" encoding="utf-8"?>
 <p:sld xmlns:a="http://schemas.openxmlformats.org/drawingml/2006/main" xmlns:r="http://schemas.openxmlformats.org/officeDocument/2006/relationships" xmlns:p="http://schemas.openxmlformats.org/presentationml/2006/main">
   <p:cSld>
     <p:spTree>
@@ -39371,7 +40055,7 @@
           <a:p>
             <a:fld id="{629637A9-119A-49DA-BD12-AAC58B377D80}" type="slidenum">
               <a:rPr lang="en-US" smtClean="0"/>
-              <a:t>53</a:t>
+              <a:t>54</a:t>
             </a:fld>
             <a:endParaRPr lang="en-US" dirty="0"/>
           </a:p>
@@ -39390,7 +40074,7 @@
 </p:sld>
 </file>
 
-<file path=ppt/slides/slide54.xml><?xml version="1.0" encoding="utf-8"?>
+<file path=ppt/slides/slide55.xml><?xml version="1.0" encoding="utf-8"?>
 <p:sld xmlns:a="http://schemas.openxmlformats.org/drawingml/2006/main" xmlns:r="http://schemas.openxmlformats.org/officeDocument/2006/relationships" xmlns:p="http://schemas.openxmlformats.org/presentationml/2006/main">
   <p:cSld>
     <p:spTree>
@@ -40670,7 +41354,7 @@
           <a:p>
             <a:fld id="{629637A9-119A-49DA-BD12-AAC58B377D80}" type="slidenum">
               <a:rPr lang="en-US" smtClean="0"/>
-              <a:t>54</a:t>
+              <a:t>55</a:t>
             </a:fld>
             <a:endParaRPr lang="en-US" dirty="0"/>
           </a:p>
@@ -40689,7 +41373,7 @@
 </p:sld>
 </file>
 
-<file path=ppt/slides/slide55.xml><?xml version="1.0" encoding="utf-8"?>
+<file path=ppt/slides/slide56.xml><?xml version="1.0" encoding="utf-8"?>
 <p:sld xmlns:a="http://schemas.openxmlformats.org/drawingml/2006/main" xmlns:r="http://schemas.openxmlformats.org/officeDocument/2006/relationships" xmlns:p="http://schemas.openxmlformats.org/presentationml/2006/main">
   <p:cSld>
     <p:spTree>
@@ -41086,7 +41770,7 @@
           <a:p>
             <a:fld id="{629637A9-119A-49DA-BD12-AAC58B377D80}" type="slidenum">
               <a:rPr lang="en-US" smtClean="0"/>
-              <a:t>55</a:t>
+              <a:t>56</a:t>
             </a:fld>
             <a:endParaRPr lang="en-US" dirty="0"/>
           </a:p>
@@ -41129,7 +41813,7 @@
 </p:sld>
 </file>
 
-<file path=ppt/slides/slide56.xml><?xml version="1.0" encoding="utf-8"?>
+<file path=ppt/slides/slide57.xml><?xml version="1.0" encoding="utf-8"?>
 <p:sld xmlns:a="http://schemas.openxmlformats.org/drawingml/2006/main" xmlns:r="http://schemas.openxmlformats.org/officeDocument/2006/relationships" xmlns:p="http://schemas.openxmlformats.org/presentationml/2006/main">
   <p:cSld>
     <p:spTree>
@@ -41861,7 +42545,7 @@
           <a:p>
             <a:fld id="{629637A9-119A-49DA-BD12-AAC58B377D80}" type="slidenum">
               <a:rPr lang="en-US" smtClean="0"/>
-              <a:t>56</a:t>
+              <a:t>57</a:t>
             </a:fld>
             <a:endParaRPr lang="en-US" dirty="0"/>
           </a:p>
@@ -41880,7 +42564,7 @@
 </p:sld>
 </file>
 
-<file path=ppt/slides/slide57.xml><?xml version="1.0" encoding="utf-8"?>
+<file path=ppt/slides/slide58.xml><?xml version="1.0" encoding="utf-8"?>
 <p:sld xmlns:a="http://schemas.openxmlformats.org/drawingml/2006/main" xmlns:r="http://schemas.openxmlformats.org/officeDocument/2006/relationships" xmlns:p="http://schemas.openxmlformats.org/presentationml/2006/main">
   <p:cSld>
     <p:spTree>
@@ -42022,7 +42706,7 @@
           <a:p>
             <a:fld id="{629637A9-119A-49DA-BD12-AAC58B377D80}" type="slidenum">
               <a:rPr lang="en-US" smtClean="0"/>
-              <a:t>57</a:t>
+              <a:t>58</a:t>
             </a:fld>
             <a:endParaRPr lang="en-US" dirty="0"/>
           </a:p>

</xml_diff>